<commit_message>
Re #1549 Better image showing spherical coordinate system
</commit_message>
<xml_diff>
--- a/documentation/user_docs/docs/images/Spherical_Coordinates_fig_source.pptx
+++ b/documentation/user_docs/docs/images/Spherical_Coordinates_fig_source.pptx
@@ -261,9 +261,9 @@
           <a:p>
             <a:fld id="{89E676B1-E656-489C-A8C6-568C80A25CEA}" type="datetimeFigureOut">
               <a:rPr lang="en-GB" smtClean="0"/>
-              <a:t>07/02/2024</a:t>
+              <a:t>14/02/2024</a:t>
             </a:fld>
-            <a:endParaRPr lang="en-GB"/>
+            <a:endParaRPr lang="en-GB" dirty="0"/>
           </a:p>
         </p:txBody>
       </p:sp>
@@ -288,7 +288,7 @@
           <a:bodyPr/>
           <a:lstStyle/>
           <a:p>
-            <a:endParaRPr lang="en-GB"/>
+            <a:endParaRPr lang="en-GB" dirty="0"/>
           </a:p>
         </p:txBody>
       </p:sp>
@@ -317,7 +317,7 @@
               <a:rPr lang="en-GB" smtClean="0"/>
               <a:t>‹#›</a:t>
             </a:fld>
-            <a:endParaRPr lang="en-GB"/>
+            <a:endParaRPr lang="en-GB" dirty="0"/>
           </a:p>
         </p:txBody>
       </p:sp>
@@ -461,9 +461,9 @@
           <a:p>
             <a:fld id="{89E676B1-E656-489C-A8C6-568C80A25CEA}" type="datetimeFigureOut">
               <a:rPr lang="en-GB" smtClean="0"/>
-              <a:t>07/02/2024</a:t>
+              <a:t>14/02/2024</a:t>
             </a:fld>
-            <a:endParaRPr lang="en-GB"/>
+            <a:endParaRPr lang="en-GB" dirty="0"/>
           </a:p>
         </p:txBody>
       </p:sp>
@@ -488,7 +488,7 @@
           <a:bodyPr/>
           <a:lstStyle/>
           <a:p>
-            <a:endParaRPr lang="en-GB"/>
+            <a:endParaRPr lang="en-GB" dirty="0"/>
           </a:p>
         </p:txBody>
       </p:sp>
@@ -517,7 +517,7 @@
               <a:rPr lang="en-GB" smtClean="0"/>
               <a:t>‹#›</a:t>
             </a:fld>
-            <a:endParaRPr lang="en-GB"/>
+            <a:endParaRPr lang="en-GB" dirty="0"/>
           </a:p>
         </p:txBody>
       </p:sp>
@@ -671,9 +671,9 @@
           <a:p>
             <a:fld id="{89E676B1-E656-489C-A8C6-568C80A25CEA}" type="datetimeFigureOut">
               <a:rPr lang="en-GB" smtClean="0"/>
-              <a:t>07/02/2024</a:t>
+              <a:t>14/02/2024</a:t>
             </a:fld>
-            <a:endParaRPr lang="en-GB"/>
+            <a:endParaRPr lang="en-GB" dirty="0"/>
           </a:p>
         </p:txBody>
       </p:sp>
@@ -698,7 +698,7 @@
           <a:bodyPr/>
           <a:lstStyle/>
           <a:p>
-            <a:endParaRPr lang="en-GB"/>
+            <a:endParaRPr lang="en-GB" dirty="0"/>
           </a:p>
         </p:txBody>
       </p:sp>
@@ -727,7 +727,7 @@
               <a:rPr lang="en-GB" smtClean="0"/>
               <a:t>‹#›</a:t>
             </a:fld>
-            <a:endParaRPr lang="en-GB"/>
+            <a:endParaRPr lang="en-GB" dirty="0"/>
           </a:p>
         </p:txBody>
       </p:sp>
@@ -871,9 +871,9 @@
           <a:p>
             <a:fld id="{89E676B1-E656-489C-A8C6-568C80A25CEA}" type="datetimeFigureOut">
               <a:rPr lang="en-GB" smtClean="0"/>
-              <a:t>07/02/2024</a:t>
+              <a:t>14/02/2024</a:t>
             </a:fld>
-            <a:endParaRPr lang="en-GB"/>
+            <a:endParaRPr lang="en-GB" dirty="0"/>
           </a:p>
         </p:txBody>
       </p:sp>
@@ -898,7 +898,7 @@
           <a:bodyPr/>
           <a:lstStyle/>
           <a:p>
-            <a:endParaRPr lang="en-GB"/>
+            <a:endParaRPr lang="en-GB" dirty="0"/>
           </a:p>
         </p:txBody>
       </p:sp>
@@ -927,7 +927,7 @@
               <a:rPr lang="en-GB" smtClean="0"/>
               <a:t>‹#›</a:t>
             </a:fld>
-            <a:endParaRPr lang="en-GB"/>
+            <a:endParaRPr lang="en-GB" dirty="0"/>
           </a:p>
         </p:txBody>
       </p:sp>
@@ -1147,9 +1147,9 @@
           <a:p>
             <a:fld id="{89E676B1-E656-489C-A8C6-568C80A25CEA}" type="datetimeFigureOut">
               <a:rPr lang="en-GB" smtClean="0"/>
-              <a:t>07/02/2024</a:t>
+              <a:t>14/02/2024</a:t>
             </a:fld>
-            <a:endParaRPr lang="en-GB"/>
+            <a:endParaRPr lang="en-GB" dirty="0"/>
           </a:p>
         </p:txBody>
       </p:sp>
@@ -1174,7 +1174,7 @@
           <a:bodyPr/>
           <a:lstStyle/>
           <a:p>
-            <a:endParaRPr lang="en-GB"/>
+            <a:endParaRPr lang="en-GB" dirty="0"/>
           </a:p>
         </p:txBody>
       </p:sp>
@@ -1203,7 +1203,7 @@
               <a:rPr lang="en-GB" smtClean="0"/>
               <a:t>‹#›</a:t>
             </a:fld>
-            <a:endParaRPr lang="en-GB"/>
+            <a:endParaRPr lang="en-GB" dirty="0"/>
           </a:p>
         </p:txBody>
       </p:sp>
@@ -1415,9 +1415,9 @@
           <a:p>
             <a:fld id="{89E676B1-E656-489C-A8C6-568C80A25CEA}" type="datetimeFigureOut">
               <a:rPr lang="en-GB" smtClean="0"/>
-              <a:t>07/02/2024</a:t>
+              <a:t>14/02/2024</a:t>
             </a:fld>
-            <a:endParaRPr lang="en-GB"/>
+            <a:endParaRPr lang="en-GB" dirty="0"/>
           </a:p>
         </p:txBody>
       </p:sp>
@@ -1442,7 +1442,7 @@
           <a:bodyPr/>
           <a:lstStyle/>
           <a:p>
-            <a:endParaRPr lang="en-GB"/>
+            <a:endParaRPr lang="en-GB" dirty="0"/>
           </a:p>
         </p:txBody>
       </p:sp>
@@ -1471,7 +1471,7 @@
               <a:rPr lang="en-GB" smtClean="0"/>
               <a:t>‹#›</a:t>
             </a:fld>
-            <a:endParaRPr lang="en-GB"/>
+            <a:endParaRPr lang="en-GB" dirty="0"/>
           </a:p>
         </p:txBody>
       </p:sp>
@@ -1830,9 +1830,9 @@
           <a:p>
             <a:fld id="{89E676B1-E656-489C-A8C6-568C80A25CEA}" type="datetimeFigureOut">
               <a:rPr lang="en-GB" smtClean="0"/>
-              <a:t>07/02/2024</a:t>
+              <a:t>14/02/2024</a:t>
             </a:fld>
-            <a:endParaRPr lang="en-GB"/>
+            <a:endParaRPr lang="en-GB" dirty="0"/>
           </a:p>
         </p:txBody>
       </p:sp>
@@ -1857,7 +1857,7 @@
           <a:bodyPr/>
           <a:lstStyle/>
           <a:p>
-            <a:endParaRPr lang="en-GB"/>
+            <a:endParaRPr lang="en-GB" dirty="0"/>
           </a:p>
         </p:txBody>
       </p:sp>
@@ -1886,7 +1886,7 @@
               <a:rPr lang="en-GB" smtClean="0"/>
               <a:t>‹#›</a:t>
             </a:fld>
-            <a:endParaRPr lang="en-GB"/>
+            <a:endParaRPr lang="en-GB" dirty="0"/>
           </a:p>
         </p:txBody>
       </p:sp>
@@ -1972,9 +1972,9 @@
           <a:p>
             <a:fld id="{89E676B1-E656-489C-A8C6-568C80A25CEA}" type="datetimeFigureOut">
               <a:rPr lang="en-GB" smtClean="0"/>
-              <a:t>07/02/2024</a:t>
+              <a:t>14/02/2024</a:t>
             </a:fld>
-            <a:endParaRPr lang="en-GB"/>
+            <a:endParaRPr lang="en-GB" dirty="0"/>
           </a:p>
         </p:txBody>
       </p:sp>
@@ -1999,7 +1999,7 @@
           <a:bodyPr/>
           <a:lstStyle/>
           <a:p>
-            <a:endParaRPr lang="en-GB"/>
+            <a:endParaRPr lang="en-GB" dirty="0"/>
           </a:p>
         </p:txBody>
       </p:sp>
@@ -2028,7 +2028,7 @@
               <a:rPr lang="en-GB" smtClean="0"/>
               <a:t>‹#›</a:t>
             </a:fld>
-            <a:endParaRPr lang="en-GB"/>
+            <a:endParaRPr lang="en-GB" dirty="0"/>
           </a:p>
         </p:txBody>
       </p:sp>
@@ -2085,9 +2085,9 @@
           <a:p>
             <a:fld id="{89E676B1-E656-489C-A8C6-568C80A25CEA}" type="datetimeFigureOut">
               <a:rPr lang="en-GB" smtClean="0"/>
-              <a:t>07/02/2024</a:t>
+              <a:t>14/02/2024</a:t>
             </a:fld>
-            <a:endParaRPr lang="en-GB"/>
+            <a:endParaRPr lang="en-GB" dirty="0"/>
           </a:p>
         </p:txBody>
       </p:sp>
@@ -2112,7 +2112,7 @@
           <a:bodyPr/>
           <a:lstStyle/>
           <a:p>
-            <a:endParaRPr lang="en-GB"/>
+            <a:endParaRPr lang="en-GB" dirty="0"/>
           </a:p>
         </p:txBody>
       </p:sp>
@@ -2141,7 +2141,7 @@
               <a:rPr lang="en-GB" smtClean="0"/>
               <a:t>‹#›</a:t>
             </a:fld>
-            <a:endParaRPr lang="en-GB"/>
+            <a:endParaRPr lang="en-GB" dirty="0"/>
           </a:p>
         </p:txBody>
       </p:sp>
@@ -2398,9 +2398,9 @@
           <a:p>
             <a:fld id="{89E676B1-E656-489C-A8C6-568C80A25CEA}" type="datetimeFigureOut">
               <a:rPr lang="en-GB" smtClean="0"/>
-              <a:t>07/02/2024</a:t>
+              <a:t>14/02/2024</a:t>
             </a:fld>
-            <a:endParaRPr lang="en-GB"/>
+            <a:endParaRPr lang="en-GB" dirty="0"/>
           </a:p>
         </p:txBody>
       </p:sp>
@@ -2425,7 +2425,7 @@
           <a:bodyPr/>
           <a:lstStyle/>
           <a:p>
-            <a:endParaRPr lang="en-GB"/>
+            <a:endParaRPr lang="en-GB" dirty="0"/>
           </a:p>
         </p:txBody>
       </p:sp>
@@ -2454,7 +2454,7 @@
               <a:rPr lang="en-GB" smtClean="0"/>
               <a:t>‹#›</a:t>
             </a:fld>
-            <a:endParaRPr lang="en-GB"/>
+            <a:endParaRPr lang="en-GB" dirty="0"/>
           </a:p>
         </p:txBody>
       </p:sp>
@@ -2589,7 +2589,7 @@
             </a:lvl9pPr>
           </a:lstStyle>
           <a:p>
-            <a:endParaRPr lang="en-GB"/>
+            <a:endParaRPr lang="en-GB" dirty="0"/>
           </a:p>
         </p:txBody>
       </p:sp>
@@ -2687,9 +2687,9 @@
           <a:p>
             <a:fld id="{89E676B1-E656-489C-A8C6-568C80A25CEA}" type="datetimeFigureOut">
               <a:rPr lang="en-GB" smtClean="0"/>
-              <a:t>07/02/2024</a:t>
+              <a:t>14/02/2024</a:t>
             </a:fld>
-            <a:endParaRPr lang="en-GB"/>
+            <a:endParaRPr lang="en-GB" dirty="0"/>
           </a:p>
         </p:txBody>
       </p:sp>
@@ -2714,7 +2714,7 @@
           <a:bodyPr/>
           <a:lstStyle/>
           <a:p>
-            <a:endParaRPr lang="en-GB"/>
+            <a:endParaRPr lang="en-GB" dirty="0"/>
           </a:p>
         </p:txBody>
       </p:sp>
@@ -2743,7 +2743,7 @@
               <a:rPr lang="en-GB" smtClean="0"/>
               <a:t>‹#›</a:t>
             </a:fld>
-            <a:endParaRPr lang="en-GB"/>
+            <a:endParaRPr lang="en-GB" dirty="0"/>
           </a:p>
         </p:txBody>
       </p:sp>
@@ -2930,9 +2930,9 @@
           <a:p>
             <a:fld id="{89E676B1-E656-489C-A8C6-568C80A25CEA}" type="datetimeFigureOut">
               <a:rPr lang="en-GB" smtClean="0"/>
-              <a:t>07/02/2024</a:t>
+              <a:t>14/02/2024</a:t>
             </a:fld>
-            <a:endParaRPr lang="en-GB"/>
+            <a:endParaRPr lang="en-GB" dirty="0"/>
           </a:p>
         </p:txBody>
       </p:sp>
@@ -2975,7 +2975,7 @@
             </a:lvl1pPr>
           </a:lstStyle>
           <a:p>
-            <a:endParaRPr lang="en-GB"/>
+            <a:endParaRPr lang="en-GB" dirty="0"/>
           </a:p>
         </p:txBody>
       </p:sp>
@@ -3022,7 +3022,7 @@
               <a:rPr lang="en-GB" smtClean="0"/>
               <a:t>‹#›</a:t>
             </a:fld>
-            <a:endParaRPr lang="en-GB"/>
+            <a:endParaRPr lang="en-GB" dirty="0"/>
           </a:p>
         </p:txBody>
       </p:sp>
@@ -3361,7 +3361,7 @@
         </p:nvSpPr>
         <p:spPr>
           <a:xfrm>
-            <a:off x="4139289" y="2602430"/>
+            <a:off x="4524083" y="2577604"/>
             <a:ext cx="492270" cy="620170"/>
           </a:xfrm>
           <a:prstGeom prst="arc">
@@ -3394,7 +3394,7 @@
           <a:lstStyle/>
           <a:p>
             <a:pPr algn="ctr"/>
-            <a:endParaRPr lang="en-GB"/>
+            <a:endParaRPr lang="en-GB" dirty="0"/>
           </a:p>
         </p:txBody>
       </p:sp>
@@ -3414,7 +3414,7 @@
         </p:nvCxnSpPr>
         <p:spPr>
           <a:xfrm flipV="1">
-            <a:off x="4363452" y="1261241"/>
+            <a:off x="4748246" y="1236415"/>
             <a:ext cx="1618436" cy="1670454"/>
           </a:xfrm>
           <a:prstGeom prst="straightConnector1">
@@ -3458,7 +3458,7 @@
         </p:nvCxnSpPr>
         <p:spPr>
           <a:xfrm flipV="1">
-            <a:off x="5969186" y="1261241"/>
+            <a:off x="6353980" y="1236415"/>
             <a:ext cx="0" cy="1409888"/>
           </a:xfrm>
           <a:prstGeom prst="straightConnector1">
@@ -3503,7 +3503,7 @@
         </p:nvCxnSpPr>
         <p:spPr>
           <a:xfrm flipV="1">
-            <a:off x="4363452" y="2671129"/>
+            <a:off x="4748246" y="2646303"/>
             <a:ext cx="1618436" cy="260566"/>
           </a:xfrm>
           <a:prstGeom prst="straightConnector1">
@@ -3546,13 +3546,13 @@
           <p:nvPr>
             <p:extLst>
               <p:ext uri="{D42A27DB-BD31-4B8C-83A1-F6EECF244321}">
-                <p14:modId xmlns:p14="http://schemas.microsoft.com/office/powerpoint/2010/main" val="159891327"/>
+                <p14:modId xmlns:p14="http://schemas.microsoft.com/office/powerpoint/2010/main" val="1057529892"/>
               </p:ext>
             </p:extLst>
           </p:nvPr>
         </p:nvGraphicFramePr>
         <p:xfrm>
-          <a:off x="3973611" y="1121791"/>
+          <a:off x="4358405" y="1096965"/>
           <a:ext cx="425876" cy="638815"/>
         </p:xfrm>
         <a:graphic>
@@ -3580,7 +3580,7 @@
                     </p:blipFill>
                     <p:spPr>
                       <a:xfrm>
-                        <a:off x="3973611" y="1121791"/>
+                        <a:off x="4358405" y="1096965"/>
                         <a:ext cx="425876" cy="638815"/>
                       </a:xfrm>
                       <a:prstGeom prst="rect">
@@ -3609,13 +3609,13 @@
           <p:nvPr>
             <p:extLst>
               <p:ext uri="{D42A27DB-BD31-4B8C-83A1-F6EECF244321}">
-                <p14:modId xmlns:p14="http://schemas.microsoft.com/office/powerpoint/2010/main" val="1488738034"/>
+                <p14:modId xmlns:p14="http://schemas.microsoft.com/office/powerpoint/2010/main" val="3190657963"/>
               </p:ext>
             </p:extLst>
           </p:nvPr>
         </p:nvGraphicFramePr>
         <p:xfrm>
-          <a:off x="5999163" y="2932113"/>
+          <a:off x="6383957" y="2907287"/>
           <a:ext cx="390525" cy="638175"/>
         </p:xfrm>
         <a:graphic>
@@ -3649,7 +3649,7 @@
                     </p:blipFill>
                     <p:spPr>
                       <a:xfrm>
-                        <a:off x="5999163" y="2932113"/>
+                        <a:off x="6383957" y="2907287"/>
                         <a:ext cx="390525" cy="638175"/>
                       </a:xfrm>
                       <a:prstGeom prst="rect">
@@ -3677,7 +3677,7 @@
         </p:nvSpPr>
         <p:spPr>
           <a:xfrm>
-            <a:off x="3999505" y="2169700"/>
+            <a:off x="4384299" y="2144874"/>
             <a:ext cx="794122" cy="621542"/>
           </a:xfrm>
           <a:prstGeom prst="arc">
@@ -3710,7 +3710,7 @@
           <a:lstStyle/>
           <a:p>
             <a:pPr algn="ctr"/>
-            <a:endParaRPr lang="en-GB"/>
+            <a:endParaRPr lang="en-GB" dirty="0"/>
           </a:p>
         </p:txBody>
       </p:sp>
@@ -3728,7 +3728,7 @@
         </p:nvSpPr>
         <p:spPr>
           <a:xfrm rot="2626853">
-            <a:off x="4914864" y="2762946"/>
+            <a:off x="5299658" y="2738120"/>
             <a:ext cx="439243" cy="432633"/>
           </a:xfrm>
           <a:prstGeom prst="arc">
@@ -3761,7 +3761,7 @@
           <a:lstStyle/>
           <a:p>
             <a:pPr algn="ctr"/>
-            <a:endParaRPr lang="en-GB"/>
+            <a:endParaRPr lang="en-GB" dirty="0"/>
           </a:p>
         </p:txBody>
       </p:sp>
@@ -3780,13 +3780,13 @@
           <p:nvPr>
             <p:extLst>
               <p:ext uri="{D42A27DB-BD31-4B8C-83A1-F6EECF244321}">
-                <p14:modId xmlns:p14="http://schemas.microsoft.com/office/powerpoint/2010/main" val="2254588529"/>
+                <p14:modId xmlns:p14="http://schemas.microsoft.com/office/powerpoint/2010/main" val="3731008851"/>
               </p:ext>
             </p:extLst>
           </p:nvPr>
         </p:nvGraphicFramePr>
         <p:xfrm>
-          <a:off x="4578123" y="1878795"/>
+          <a:off x="4962917" y="1853969"/>
           <a:ext cx="354012" cy="388896"/>
         </p:xfrm>
         <a:graphic>
@@ -3820,7 +3820,7 @@
                     </p:blipFill>
                     <p:spPr>
                       <a:xfrm>
-                        <a:off x="4578123" y="1878795"/>
+                        <a:off x="4962917" y="1853969"/>
                         <a:ext cx="354012" cy="388896"/>
                       </a:xfrm>
                       <a:prstGeom prst="rect">
@@ -3849,13 +3849,13 @@
           <p:nvPr>
             <p:extLst>
               <p:ext uri="{D42A27DB-BD31-4B8C-83A1-F6EECF244321}">
-                <p14:modId xmlns:p14="http://schemas.microsoft.com/office/powerpoint/2010/main" val="3908577449"/>
+                <p14:modId xmlns:p14="http://schemas.microsoft.com/office/powerpoint/2010/main" val="2971038521"/>
               </p:ext>
             </p:extLst>
           </p:nvPr>
         </p:nvGraphicFramePr>
         <p:xfrm>
-          <a:off x="5371191" y="2902639"/>
+          <a:off x="5755985" y="2877813"/>
           <a:ext cx="354012" cy="444500"/>
         </p:xfrm>
         <a:graphic>
@@ -3889,7 +3889,7 @@
                     </p:blipFill>
                     <p:spPr>
                       <a:xfrm>
-                        <a:off x="5371191" y="2902639"/>
+                        <a:off x="5755985" y="2877813"/>
                         <a:ext cx="354012" cy="444500"/>
                       </a:xfrm>
                       <a:prstGeom prst="rect">
@@ -3919,7 +3919,7 @@
         </p:nvCxnSpPr>
         <p:spPr>
           <a:xfrm flipV="1">
-            <a:off x="5416559" y="2673246"/>
+            <a:off x="5801353" y="2648420"/>
             <a:ext cx="552117" cy="259563"/>
           </a:xfrm>
           <a:prstGeom prst="straightConnector1">
@@ -3964,7 +3964,7 @@
         </p:nvCxnSpPr>
         <p:spPr>
           <a:xfrm>
-            <a:off x="4927319" y="2664610"/>
+            <a:off x="5312113" y="2639784"/>
             <a:ext cx="1029607" cy="6518"/>
           </a:xfrm>
           <a:prstGeom prst="straightConnector1">
@@ -4009,7 +4009,7 @@
         </p:nvCxnSpPr>
         <p:spPr>
           <a:xfrm flipV="1">
-            <a:off x="4350240" y="2432394"/>
+            <a:off x="4735034" y="2407568"/>
             <a:ext cx="1055080" cy="499301"/>
           </a:xfrm>
           <a:prstGeom prst="straightConnector1">
@@ -4052,13 +4052,13 @@
           <p:nvPr>
             <p:extLst>
               <p:ext uri="{D42A27DB-BD31-4B8C-83A1-F6EECF244321}">
-                <p14:modId xmlns:p14="http://schemas.microsoft.com/office/powerpoint/2010/main" val="3939472850"/>
+                <p14:modId xmlns:p14="http://schemas.microsoft.com/office/powerpoint/2010/main" val="1964263374"/>
               </p:ext>
             </p:extLst>
           </p:nvPr>
         </p:nvGraphicFramePr>
         <p:xfrm>
-          <a:off x="5770982" y="3520746"/>
+          <a:off x="6155776" y="3495920"/>
           <a:ext cx="425876" cy="638815"/>
         </p:xfrm>
         <a:graphic>
@@ -4092,7 +4092,7 @@
                     </p:blipFill>
                     <p:spPr>
                       <a:xfrm>
-                        <a:off x="5770982" y="3520746"/>
+                        <a:off x="6155776" y="3495920"/>
                         <a:ext cx="425876" cy="638815"/>
                       </a:xfrm>
                       <a:prstGeom prst="rect">
@@ -4120,7 +4120,7 @@
         </p:nvSpPr>
         <p:spPr>
           <a:xfrm>
-            <a:off x="4367524" y="2735723"/>
+            <a:off x="4752318" y="2710897"/>
             <a:ext cx="211016" cy="190299"/>
           </a:xfrm>
           <a:prstGeom prst="rect">
@@ -4154,7 +4154,7 @@
           <a:lstStyle/>
           <a:p>
             <a:pPr algn="ctr"/>
-            <a:endParaRPr lang="en-GB"/>
+            <a:endParaRPr lang="en-GB" dirty="0"/>
           </a:p>
         </p:txBody>
       </p:sp>
@@ -4174,7 +4174,7 @@
         </p:nvCxnSpPr>
         <p:spPr>
           <a:xfrm flipV="1">
-            <a:off x="4363452" y="1407695"/>
+            <a:off x="4748246" y="1382869"/>
             <a:ext cx="0" cy="1524000"/>
           </a:xfrm>
           <a:prstGeom prst="straightConnector1">
@@ -4218,7 +4218,7 @@
         </p:nvCxnSpPr>
         <p:spPr>
           <a:xfrm>
-            <a:off x="4578123" y="2816419"/>
+            <a:off x="4962917" y="2791593"/>
             <a:ext cx="0" cy="204064"/>
           </a:xfrm>
           <a:prstGeom prst="line">
@@ -4257,7 +4257,7 @@
         </p:nvCxnSpPr>
         <p:spPr>
           <a:xfrm>
-            <a:off x="4396566" y="2931695"/>
+            <a:off x="4781360" y="2906869"/>
             <a:ext cx="1925053" cy="0"/>
           </a:xfrm>
           <a:prstGeom prst="straightConnector1">
@@ -4301,7 +4301,7 @@
         </p:nvCxnSpPr>
         <p:spPr>
           <a:xfrm>
-            <a:off x="4350240" y="2931695"/>
+            <a:off x="4735034" y="2906869"/>
             <a:ext cx="1842599" cy="768006"/>
           </a:xfrm>
           <a:prstGeom prst="straightConnector1">
@@ -4344,13 +4344,13 @@
           <p:nvPr>
             <p:extLst>
               <p:ext uri="{D42A27DB-BD31-4B8C-83A1-F6EECF244321}">
-                <p14:modId xmlns:p14="http://schemas.microsoft.com/office/powerpoint/2010/main" val="3482522807"/>
+                <p14:modId xmlns:p14="http://schemas.microsoft.com/office/powerpoint/2010/main" val="2042498566"/>
               </p:ext>
             </p:extLst>
           </p:nvPr>
         </p:nvGraphicFramePr>
         <p:xfrm>
-          <a:off x="4186549" y="2182865"/>
+          <a:off x="4571343" y="2158039"/>
           <a:ext cx="152400" cy="203200"/>
         </p:xfrm>
         <a:graphic>
@@ -4378,7 +4378,7 @@
                     </p:blipFill>
                     <p:spPr>
                       <a:xfrm>
-                        <a:off x="4186549" y="2182865"/>
+                        <a:off x="4571343" y="2158039"/>
                         <a:ext cx="152400" cy="203200"/>
                       </a:xfrm>
                       <a:prstGeom prst="rect">
@@ -4407,13 +4407,13 @@
           <p:nvPr>
             <p:extLst>
               <p:ext uri="{D42A27DB-BD31-4B8C-83A1-F6EECF244321}">
-                <p14:modId xmlns:p14="http://schemas.microsoft.com/office/powerpoint/2010/main" val="1878322721"/>
+                <p14:modId xmlns:p14="http://schemas.microsoft.com/office/powerpoint/2010/main" val="1183454284"/>
               </p:ext>
             </p:extLst>
           </p:nvPr>
         </p:nvGraphicFramePr>
         <p:xfrm>
-          <a:off x="4975225" y="3254375"/>
+          <a:off x="5360019" y="3229549"/>
           <a:ext cx="165100" cy="203200"/>
         </p:xfrm>
         <a:graphic>
@@ -4447,7 +4447,7 @@
                     </p:blipFill>
                     <p:spPr>
                       <a:xfrm>
-                        <a:off x="4975225" y="3254375"/>
+                        <a:off x="5360019" y="3229549"/>
                         <a:ext cx="165100" cy="203200"/>
                       </a:xfrm>
                       <a:prstGeom prst="rect">
@@ -4476,13 +4476,13 @@
           <p:nvPr>
             <p:extLst>
               <p:ext uri="{D42A27DB-BD31-4B8C-83A1-F6EECF244321}">
-                <p14:modId xmlns:p14="http://schemas.microsoft.com/office/powerpoint/2010/main" val="431369268"/>
+                <p14:modId xmlns:p14="http://schemas.microsoft.com/office/powerpoint/2010/main" val="3405083100"/>
               </p:ext>
             </p:extLst>
           </p:nvPr>
         </p:nvGraphicFramePr>
         <p:xfrm>
-          <a:off x="4447410" y="2455341"/>
+          <a:off x="4832204" y="2430515"/>
           <a:ext cx="190500" cy="203200"/>
         </p:xfrm>
         <a:graphic>
@@ -4516,7 +4516,7 @@
                     </p:blipFill>
                     <p:spPr>
                       <a:xfrm>
-                        <a:off x="4447410" y="2455341"/>
+                        <a:off x="4832204" y="2430515"/>
                         <a:ext cx="190500" cy="203200"/>
                       </a:xfrm>
                       <a:prstGeom prst="rect">
@@ -4530,6 +4530,1232 @@
           </a:graphicData>
         </a:graphic>
       </p:graphicFrame>
+      <p:sp>
+        <p:nvSpPr>
+          <p:cNvPr id="3" name="Arc 2">
+            <a:extLst>
+              <a:ext uri="{FF2B5EF4-FFF2-40B4-BE49-F238E27FC236}">
+                <a16:creationId xmlns:a16="http://schemas.microsoft.com/office/drawing/2014/main" id="{262E3CBF-6752-5405-F3E1-6D91540B2918}"/>
+              </a:ext>
+            </a:extLst>
+          </p:cNvPr>
+          <p:cNvSpPr/>
+          <p:nvPr/>
+        </p:nvSpPr>
+        <p:spPr>
+          <a:xfrm>
+            <a:off x="1060231" y="2754830"/>
+            <a:ext cx="492270" cy="620170"/>
+          </a:xfrm>
+          <a:prstGeom prst="arc">
+            <a:avLst>
+              <a:gd name="adj1" fmla="val 15761876"/>
+              <a:gd name="adj2" fmla="val 497198"/>
+            </a:avLst>
+          </a:prstGeom>
+          <a:ln>
+            <a:headEnd type="stealth"/>
+            <a:tailEnd type="stealth"/>
+          </a:ln>
+        </p:spPr>
+        <p:style>
+          <a:lnRef idx="1">
+            <a:schemeClr val="accent1"/>
+          </a:lnRef>
+          <a:fillRef idx="0">
+            <a:schemeClr val="accent1"/>
+          </a:fillRef>
+          <a:effectRef idx="0">
+            <a:schemeClr val="accent1"/>
+          </a:effectRef>
+          <a:fontRef idx="minor">
+            <a:schemeClr val="tx1"/>
+          </a:fontRef>
+        </p:style>
+        <p:txBody>
+          <a:bodyPr rtlCol="0" anchor="ctr"/>
+          <a:lstStyle/>
+          <a:p>
+            <a:pPr algn="ctr"/>
+            <a:endParaRPr lang="en-GB" dirty="0"/>
+          </a:p>
+        </p:txBody>
+      </p:sp>
+      <p:cxnSp>
+        <p:nvCxnSpPr>
+          <p:cNvPr id="4" name="Straight Arrow Connector 3">
+            <a:extLst>
+              <a:ext uri="{FF2B5EF4-FFF2-40B4-BE49-F238E27FC236}">
+                <a16:creationId xmlns:a16="http://schemas.microsoft.com/office/drawing/2014/main" id="{6043F1E4-619D-0488-2C0C-E49D5D25CF52}"/>
+              </a:ext>
+            </a:extLst>
+          </p:cNvPr>
+          <p:cNvCxnSpPr>
+            <a:cxnSpLocks/>
+          </p:cNvCxnSpPr>
+          <p:nvPr/>
+        </p:nvCxnSpPr>
+        <p:spPr>
+          <a:xfrm flipV="1">
+            <a:off x="1284394" y="1413641"/>
+            <a:ext cx="1618436" cy="1670454"/>
+          </a:xfrm>
+          <a:prstGeom prst="straightConnector1">
+            <a:avLst/>
+          </a:prstGeom>
+          <a:ln w="12700">
+            <a:solidFill>
+              <a:schemeClr val="accent1"/>
+            </a:solidFill>
+            <a:tailEnd type="triangle"/>
+          </a:ln>
+        </p:spPr>
+        <p:style>
+          <a:lnRef idx="1">
+            <a:schemeClr val="accent1"/>
+          </a:lnRef>
+          <a:fillRef idx="0">
+            <a:schemeClr val="accent1"/>
+          </a:fillRef>
+          <a:effectRef idx="0">
+            <a:schemeClr val="accent1"/>
+          </a:effectRef>
+          <a:fontRef idx="minor">
+            <a:schemeClr val="tx1"/>
+          </a:fontRef>
+        </p:style>
+      </p:cxnSp>
+      <p:cxnSp>
+        <p:nvCxnSpPr>
+          <p:cNvPr id="6" name="Straight Arrow Connector 5">
+            <a:extLst>
+              <a:ext uri="{FF2B5EF4-FFF2-40B4-BE49-F238E27FC236}">
+                <a16:creationId xmlns:a16="http://schemas.microsoft.com/office/drawing/2014/main" id="{C84A79C3-C502-77C3-1AAB-CAD0045E8738}"/>
+              </a:ext>
+            </a:extLst>
+          </p:cNvPr>
+          <p:cNvCxnSpPr>
+            <a:cxnSpLocks/>
+          </p:cNvCxnSpPr>
+          <p:nvPr/>
+        </p:nvCxnSpPr>
+        <p:spPr>
+          <a:xfrm flipV="1">
+            <a:off x="2890128" y="1413641"/>
+            <a:ext cx="0" cy="1409888"/>
+          </a:xfrm>
+          <a:prstGeom prst="straightConnector1">
+            <a:avLst/>
+          </a:prstGeom>
+          <a:ln w="12700">
+            <a:solidFill>
+              <a:schemeClr val="accent1"/>
+            </a:solidFill>
+            <a:prstDash val="dash"/>
+            <a:tailEnd type="none"/>
+          </a:ln>
+        </p:spPr>
+        <p:style>
+          <a:lnRef idx="1">
+            <a:schemeClr val="accent1"/>
+          </a:lnRef>
+          <a:fillRef idx="0">
+            <a:schemeClr val="accent1"/>
+          </a:fillRef>
+          <a:effectRef idx="0">
+            <a:schemeClr val="accent1"/>
+          </a:effectRef>
+          <a:fontRef idx="minor">
+            <a:schemeClr val="tx1"/>
+          </a:fontRef>
+        </p:style>
+      </p:cxnSp>
+      <p:cxnSp>
+        <p:nvCxnSpPr>
+          <p:cNvPr id="9" name="Straight Arrow Connector 8">
+            <a:extLst>
+              <a:ext uri="{FF2B5EF4-FFF2-40B4-BE49-F238E27FC236}">
+                <a16:creationId xmlns:a16="http://schemas.microsoft.com/office/drawing/2014/main" id="{72448971-94A1-E760-AC5A-E79CD697FF0F}"/>
+              </a:ext>
+            </a:extLst>
+          </p:cNvPr>
+          <p:cNvCxnSpPr>
+            <a:cxnSpLocks/>
+          </p:cNvCxnSpPr>
+          <p:nvPr/>
+        </p:nvCxnSpPr>
+        <p:spPr>
+          <a:xfrm flipV="1">
+            <a:off x="1284394" y="2823529"/>
+            <a:ext cx="1618436" cy="260566"/>
+          </a:xfrm>
+          <a:prstGeom prst="straightConnector1">
+            <a:avLst/>
+          </a:prstGeom>
+          <a:ln w="12700">
+            <a:solidFill>
+              <a:schemeClr val="accent1"/>
+            </a:solidFill>
+            <a:tailEnd type="none"/>
+          </a:ln>
+        </p:spPr>
+        <p:style>
+          <a:lnRef idx="1">
+            <a:schemeClr val="accent1"/>
+          </a:lnRef>
+          <a:fillRef idx="0">
+            <a:schemeClr val="accent1"/>
+          </a:fillRef>
+          <a:effectRef idx="0">
+            <a:schemeClr val="accent1"/>
+          </a:effectRef>
+          <a:fontRef idx="minor">
+            <a:schemeClr val="tx1"/>
+          </a:fontRef>
+        </p:style>
+      </p:cxnSp>
+      <p:graphicFrame>
+        <p:nvGraphicFramePr>
+          <p:cNvPr id="13" name="Object 12">
+            <a:extLst>
+              <a:ext uri="{FF2B5EF4-FFF2-40B4-BE49-F238E27FC236}">
+                <a16:creationId xmlns:a16="http://schemas.microsoft.com/office/drawing/2014/main" id="{37C8A4BE-8534-1B96-5F08-888FE430EBA2}"/>
+              </a:ext>
+            </a:extLst>
+          </p:cNvPr>
+          <p:cNvGraphicFramePr>
+            <a:graphicFrameLocks noChangeAspect="1"/>
+          </p:cNvGraphicFramePr>
+          <p:nvPr>
+            <p:extLst>
+              <p:ext uri="{D42A27DB-BD31-4B8C-83A1-F6EECF244321}">
+                <p14:modId xmlns:p14="http://schemas.microsoft.com/office/powerpoint/2010/main" val="885097193"/>
+              </p:ext>
+            </p:extLst>
+          </p:nvPr>
+        </p:nvGraphicFramePr>
+        <p:xfrm>
+          <a:off x="894553" y="1274191"/>
+          <a:ext cx="425876" cy="638815"/>
+        </p:xfrm>
+        <a:graphic>
+          <a:graphicData uri="http://schemas.openxmlformats.org/presentationml/2006/ole">
+            <mc:AlternateContent xmlns:mc="http://schemas.openxmlformats.org/markup-compatibility/2006">
+              <mc:Choice xmlns:v="urn:schemas-microsoft-com:vml" Requires="v">
+                <p:oleObj name="Equation" r:id="rId2" imgW="152280" imgH="228600" progId="Equation.DSMT4">
+                  <p:embed/>
+                </p:oleObj>
+              </mc:Choice>
+              <mc:Fallback>
+                <p:oleObj name="Equation" r:id="rId2" imgW="152280" imgH="228600" progId="Equation.DSMT4">
+                  <p:embed/>
+                  <p:pic>
+                    <p:nvPicPr>
+                      <p:cNvPr id="25" name="Object 24">
+                        <a:extLst>
+                          <a:ext uri="{FF2B5EF4-FFF2-40B4-BE49-F238E27FC236}">
+                            <a16:creationId xmlns:a16="http://schemas.microsoft.com/office/drawing/2014/main" id="{DA3F1090-D296-5112-5DB6-F151B57FF73C}"/>
+                          </a:ext>
+                        </a:extLst>
+                      </p:cNvPr>
+                      <p:cNvPicPr/>
+                      <p:nvPr/>
+                    </p:nvPicPr>
+                    <p:blipFill>
+                      <a:blip r:embed="rId3"/>
+                      <a:stretch>
+                        <a:fillRect/>
+                      </a:stretch>
+                    </p:blipFill>
+                    <p:spPr>
+                      <a:xfrm>
+                        <a:off x="894553" y="1274191"/>
+                        <a:ext cx="425876" cy="638815"/>
+                      </a:xfrm>
+                      <a:prstGeom prst="rect">
+                        <a:avLst/>
+                      </a:prstGeom>
+                    </p:spPr>
+                  </p:pic>
+                </p:oleObj>
+              </mc:Fallback>
+            </mc:AlternateContent>
+          </a:graphicData>
+        </a:graphic>
+      </p:graphicFrame>
+      <p:graphicFrame>
+        <p:nvGraphicFramePr>
+          <p:cNvPr id="16" name="Object 15">
+            <a:extLst>
+              <a:ext uri="{FF2B5EF4-FFF2-40B4-BE49-F238E27FC236}">
+                <a16:creationId xmlns:a16="http://schemas.microsoft.com/office/drawing/2014/main" id="{63589F51-CBB4-6EA0-2270-C774CD5641EC}"/>
+              </a:ext>
+            </a:extLst>
+          </p:cNvPr>
+          <p:cNvGraphicFramePr>
+            <a:graphicFrameLocks noChangeAspect="1"/>
+          </p:cNvGraphicFramePr>
+          <p:nvPr>
+            <p:extLst>
+              <p:ext uri="{D42A27DB-BD31-4B8C-83A1-F6EECF244321}">
+                <p14:modId xmlns:p14="http://schemas.microsoft.com/office/powerpoint/2010/main" val="80622585"/>
+              </p:ext>
+            </p:extLst>
+          </p:nvPr>
+        </p:nvGraphicFramePr>
+        <p:xfrm>
+          <a:off x="2920105" y="3084513"/>
+          <a:ext cx="390525" cy="638175"/>
+        </p:xfrm>
+        <a:graphic>
+          <a:graphicData uri="http://schemas.openxmlformats.org/presentationml/2006/ole">
+            <mc:AlternateContent xmlns:mc="http://schemas.openxmlformats.org/markup-compatibility/2006">
+              <mc:Choice xmlns:v="urn:schemas-microsoft-com:vml" Requires="v">
+                <p:oleObj name="Equation" r:id="rId4" imgW="139680" imgH="228600" progId="Equation.DSMT4">
+                  <p:embed/>
+                </p:oleObj>
+              </mc:Choice>
+              <mc:Fallback>
+                <p:oleObj name="Equation" r:id="rId4" imgW="139680" imgH="228600" progId="Equation.DSMT4">
+                  <p:embed/>
+                  <p:pic>
+                    <p:nvPicPr>
+                      <p:cNvPr id="26" name="Object 25">
+                        <a:extLst>
+                          <a:ext uri="{FF2B5EF4-FFF2-40B4-BE49-F238E27FC236}">
+                            <a16:creationId xmlns:a16="http://schemas.microsoft.com/office/drawing/2014/main" id="{3AB0101E-068D-6710-85D9-F21156A6DC08}"/>
+                          </a:ext>
+                        </a:extLst>
+                      </p:cNvPr>
+                      <p:cNvPicPr/>
+                      <p:nvPr/>
+                    </p:nvPicPr>
+                    <p:blipFill>
+                      <a:blip r:embed="rId5"/>
+                      <a:stretch>
+                        <a:fillRect/>
+                      </a:stretch>
+                    </p:blipFill>
+                    <p:spPr>
+                      <a:xfrm>
+                        <a:off x="2920105" y="3084513"/>
+                        <a:ext cx="390525" cy="638175"/>
+                      </a:xfrm>
+                      <a:prstGeom prst="rect">
+                        <a:avLst/>
+                      </a:prstGeom>
+                    </p:spPr>
+                  </p:pic>
+                </p:oleObj>
+              </mc:Fallback>
+            </mc:AlternateContent>
+          </a:graphicData>
+        </a:graphic>
+      </p:graphicFrame>
+      <p:sp>
+        <p:nvSpPr>
+          <p:cNvPr id="17" name="Arc 16">
+            <a:extLst>
+              <a:ext uri="{FF2B5EF4-FFF2-40B4-BE49-F238E27FC236}">
+                <a16:creationId xmlns:a16="http://schemas.microsoft.com/office/drawing/2014/main" id="{25329D82-ACF1-A86F-4A63-C758BFAB52BB}"/>
+              </a:ext>
+            </a:extLst>
+          </p:cNvPr>
+          <p:cNvSpPr/>
+          <p:nvPr/>
+        </p:nvSpPr>
+        <p:spPr>
+          <a:xfrm>
+            <a:off x="920447" y="2322100"/>
+            <a:ext cx="794122" cy="621542"/>
+          </a:xfrm>
+          <a:prstGeom prst="arc">
+            <a:avLst>
+              <a:gd name="adj1" fmla="val 15867340"/>
+              <a:gd name="adj2" fmla="val 21530292"/>
+            </a:avLst>
+          </a:prstGeom>
+          <a:ln>
+            <a:headEnd type="stealth"/>
+            <a:tailEnd type="stealth"/>
+          </a:ln>
+        </p:spPr>
+        <p:style>
+          <a:lnRef idx="1">
+            <a:schemeClr val="accent1"/>
+          </a:lnRef>
+          <a:fillRef idx="0">
+            <a:schemeClr val="accent1"/>
+          </a:fillRef>
+          <a:effectRef idx="0">
+            <a:schemeClr val="accent1"/>
+          </a:effectRef>
+          <a:fontRef idx="minor">
+            <a:schemeClr val="tx1"/>
+          </a:fontRef>
+        </p:style>
+        <p:txBody>
+          <a:bodyPr rtlCol="0" anchor="ctr"/>
+          <a:lstStyle/>
+          <a:p>
+            <a:pPr algn="ctr"/>
+            <a:endParaRPr lang="en-GB" dirty="0"/>
+          </a:p>
+        </p:txBody>
+      </p:sp>
+      <p:sp>
+        <p:nvSpPr>
+          <p:cNvPr id="23" name="Arc 22">
+            <a:extLst>
+              <a:ext uri="{FF2B5EF4-FFF2-40B4-BE49-F238E27FC236}">
+                <a16:creationId xmlns:a16="http://schemas.microsoft.com/office/drawing/2014/main" id="{11783904-AE4F-4CAA-722E-CD6783B72280}"/>
+              </a:ext>
+            </a:extLst>
+          </p:cNvPr>
+          <p:cNvSpPr/>
+          <p:nvPr/>
+        </p:nvSpPr>
+        <p:spPr>
+          <a:xfrm rot="2626853">
+            <a:off x="1835806" y="2915346"/>
+            <a:ext cx="439243" cy="432633"/>
+          </a:xfrm>
+          <a:prstGeom prst="arc">
+            <a:avLst>
+              <a:gd name="adj1" fmla="val 15367859"/>
+              <a:gd name="adj2" fmla="val 20252165"/>
+            </a:avLst>
+          </a:prstGeom>
+          <a:ln>
+            <a:headEnd type="stealth"/>
+            <a:tailEnd type="diamond"/>
+          </a:ln>
+        </p:spPr>
+        <p:style>
+          <a:lnRef idx="1">
+            <a:schemeClr val="accent1"/>
+          </a:lnRef>
+          <a:fillRef idx="0">
+            <a:schemeClr val="accent1"/>
+          </a:fillRef>
+          <a:effectRef idx="0">
+            <a:schemeClr val="accent1"/>
+          </a:effectRef>
+          <a:fontRef idx="minor">
+            <a:schemeClr val="tx1"/>
+          </a:fontRef>
+        </p:style>
+        <p:txBody>
+          <a:bodyPr rtlCol="0" anchor="ctr"/>
+          <a:lstStyle/>
+          <a:p>
+            <a:pPr algn="ctr"/>
+            <a:endParaRPr lang="en-GB" dirty="0"/>
+          </a:p>
+        </p:txBody>
+      </p:sp>
+      <p:graphicFrame>
+        <p:nvGraphicFramePr>
+          <p:cNvPr id="24" name="Object 23">
+            <a:extLst>
+              <a:ext uri="{FF2B5EF4-FFF2-40B4-BE49-F238E27FC236}">
+                <a16:creationId xmlns:a16="http://schemas.microsoft.com/office/drawing/2014/main" id="{F0FA7288-ADBF-2FF2-6906-9F68C4E4538C}"/>
+              </a:ext>
+            </a:extLst>
+          </p:cNvPr>
+          <p:cNvGraphicFramePr>
+            <a:graphicFrameLocks noChangeAspect="1"/>
+          </p:cNvGraphicFramePr>
+          <p:nvPr>
+            <p:extLst>
+              <p:ext uri="{D42A27DB-BD31-4B8C-83A1-F6EECF244321}">
+                <p14:modId xmlns:p14="http://schemas.microsoft.com/office/powerpoint/2010/main" val="193055852"/>
+              </p:ext>
+            </p:extLst>
+          </p:nvPr>
+        </p:nvGraphicFramePr>
+        <p:xfrm>
+          <a:off x="1499065" y="2031195"/>
+          <a:ext cx="354012" cy="388896"/>
+        </p:xfrm>
+        <a:graphic>
+          <a:graphicData uri="http://schemas.openxmlformats.org/presentationml/2006/ole">
+            <mc:AlternateContent xmlns:mc="http://schemas.openxmlformats.org/markup-compatibility/2006">
+              <mc:Choice xmlns:v="urn:schemas-microsoft-com:vml" Requires="v">
+                <p:oleObj name="Equation" r:id="rId6" imgW="126720" imgH="177480" progId="Equation.DSMT4">
+                  <p:embed/>
+                </p:oleObj>
+              </mc:Choice>
+              <mc:Fallback>
+                <p:oleObj name="Equation" r:id="rId6" imgW="126720" imgH="177480" progId="Equation.DSMT4">
+                  <p:embed/>
+                  <p:pic>
+                    <p:nvPicPr>
+                      <p:cNvPr id="29" name="Object 28">
+                        <a:extLst>
+                          <a:ext uri="{FF2B5EF4-FFF2-40B4-BE49-F238E27FC236}">
+                            <a16:creationId xmlns:a16="http://schemas.microsoft.com/office/drawing/2014/main" id="{6E3DB355-BDBE-85C3-85C8-AE961563CA8C}"/>
+                          </a:ext>
+                        </a:extLst>
+                      </p:cNvPr>
+                      <p:cNvPicPr/>
+                      <p:nvPr/>
+                    </p:nvPicPr>
+                    <p:blipFill>
+                      <a:blip r:embed="rId7"/>
+                      <a:stretch>
+                        <a:fillRect/>
+                      </a:stretch>
+                    </p:blipFill>
+                    <p:spPr>
+                      <a:xfrm>
+                        <a:off x="1499065" y="2031195"/>
+                        <a:ext cx="354012" cy="388896"/>
+                      </a:xfrm>
+                      <a:prstGeom prst="rect">
+                        <a:avLst/>
+                      </a:prstGeom>
+                    </p:spPr>
+                  </p:pic>
+                </p:oleObj>
+              </mc:Fallback>
+            </mc:AlternateContent>
+          </a:graphicData>
+        </a:graphic>
+      </p:graphicFrame>
+      <p:graphicFrame>
+        <p:nvGraphicFramePr>
+          <p:cNvPr id="32" name="Object 31">
+            <a:extLst>
+              <a:ext uri="{FF2B5EF4-FFF2-40B4-BE49-F238E27FC236}">
+                <a16:creationId xmlns:a16="http://schemas.microsoft.com/office/drawing/2014/main" id="{225E26F2-D4BC-0616-EFCF-13FAC51FDFC1}"/>
+              </a:ext>
+            </a:extLst>
+          </p:cNvPr>
+          <p:cNvGraphicFramePr>
+            <a:graphicFrameLocks noChangeAspect="1"/>
+          </p:cNvGraphicFramePr>
+          <p:nvPr>
+            <p:extLst>
+              <p:ext uri="{D42A27DB-BD31-4B8C-83A1-F6EECF244321}">
+                <p14:modId xmlns:p14="http://schemas.microsoft.com/office/powerpoint/2010/main" val="4084343584"/>
+              </p:ext>
+            </p:extLst>
+          </p:nvPr>
+        </p:nvGraphicFramePr>
+        <p:xfrm>
+          <a:off x="2292133" y="3055039"/>
+          <a:ext cx="354012" cy="444500"/>
+        </p:xfrm>
+        <a:graphic>
+          <a:graphicData uri="http://schemas.openxmlformats.org/presentationml/2006/ole">
+            <mc:AlternateContent xmlns:mc="http://schemas.openxmlformats.org/markup-compatibility/2006">
+              <mc:Choice xmlns:v="urn:schemas-microsoft-com:vml" Requires="v">
+                <p:oleObj name="Equation" r:id="rId8" imgW="126720" imgH="203040" progId="Equation.DSMT4">
+                  <p:embed/>
+                </p:oleObj>
+              </mc:Choice>
+              <mc:Fallback>
+                <p:oleObj name="Equation" r:id="rId8" imgW="126720" imgH="203040" progId="Equation.DSMT4">
+                  <p:embed/>
+                  <p:pic>
+                    <p:nvPicPr>
+                      <p:cNvPr id="30" name="Object 29">
+                        <a:extLst>
+                          <a:ext uri="{FF2B5EF4-FFF2-40B4-BE49-F238E27FC236}">
+                            <a16:creationId xmlns:a16="http://schemas.microsoft.com/office/drawing/2014/main" id="{6DCDB1B2-6590-149F-A7FB-8819FEC137CB}"/>
+                          </a:ext>
+                        </a:extLst>
+                      </p:cNvPr>
+                      <p:cNvPicPr/>
+                      <p:nvPr/>
+                    </p:nvPicPr>
+                    <p:blipFill>
+                      <a:blip r:embed="rId9"/>
+                      <a:stretch>
+                        <a:fillRect/>
+                      </a:stretch>
+                    </p:blipFill>
+                    <p:spPr>
+                      <a:xfrm>
+                        <a:off x="2292133" y="3055039"/>
+                        <a:ext cx="354012" cy="444500"/>
+                      </a:xfrm>
+                      <a:prstGeom prst="rect">
+                        <a:avLst/>
+                      </a:prstGeom>
+                    </p:spPr>
+                  </p:pic>
+                </p:oleObj>
+              </mc:Fallback>
+            </mc:AlternateContent>
+          </a:graphicData>
+        </a:graphic>
+      </p:graphicFrame>
+      <p:cxnSp>
+        <p:nvCxnSpPr>
+          <p:cNvPr id="33" name="Straight Arrow Connector 32">
+            <a:extLst>
+              <a:ext uri="{FF2B5EF4-FFF2-40B4-BE49-F238E27FC236}">
+                <a16:creationId xmlns:a16="http://schemas.microsoft.com/office/drawing/2014/main" id="{ED934000-4221-E19B-903E-93DB973C77EA}"/>
+              </a:ext>
+            </a:extLst>
+          </p:cNvPr>
+          <p:cNvCxnSpPr>
+            <a:cxnSpLocks/>
+          </p:cNvCxnSpPr>
+          <p:nvPr/>
+        </p:nvCxnSpPr>
+        <p:spPr>
+          <a:xfrm flipV="1">
+            <a:off x="2337501" y="2825646"/>
+            <a:ext cx="552117" cy="259563"/>
+          </a:xfrm>
+          <a:prstGeom prst="straightConnector1">
+            <a:avLst/>
+          </a:prstGeom>
+          <a:ln w="12700">
+            <a:solidFill>
+              <a:schemeClr val="accent1"/>
+            </a:solidFill>
+            <a:prstDash val="dash"/>
+            <a:tailEnd type="none"/>
+          </a:ln>
+        </p:spPr>
+        <p:style>
+          <a:lnRef idx="1">
+            <a:schemeClr val="accent1"/>
+          </a:lnRef>
+          <a:fillRef idx="0">
+            <a:schemeClr val="accent1"/>
+          </a:fillRef>
+          <a:effectRef idx="0">
+            <a:schemeClr val="accent1"/>
+          </a:effectRef>
+          <a:fontRef idx="minor">
+            <a:schemeClr val="tx1"/>
+          </a:fontRef>
+        </p:style>
+      </p:cxnSp>
+      <p:cxnSp>
+        <p:nvCxnSpPr>
+          <p:cNvPr id="34" name="Straight Arrow Connector 33">
+            <a:extLst>
+              <a:ext uri="{FF2B5EF4-FFF2-40B4-BE49-F238E27FC236}">
+                <a16:creationId xmlns:a16="http://schemas.microsoft.com/office/drawing/2014/main" id="{A33CDC1D-E38A-3257-11BD-44C49560A372}"/>
+              </a:ext>
+            </a:extLst>
+          </p:cNvPr>
+          <p:cNvCxnSpPr>
+            <a:cxnSpLocks/>
+          </p:cNvCxnSpPr>
+          <p:nvPr/>
+        </p:nvCxnSpPr>
+        <p:spPr>
+          <a:xfrm>
+            <a:off x="1848261" y="2817010"/>
+            <a:ext cx="1029607" cy="6518"/>
+          </a:xfrm>
+          <a:prstGeom prst="straightConnector1">
+            <a:avLst/>
+          </a:prstGeom>
+          <a:ln w="12700">
+            <a:solidFill>
+              <a:schemeClr val="accent1"/>
+            </a:solidFill>
+            <a:prstDash val="dash"/>
+            <a:tailEnd type="none"/>
+          </a:ln>
+        </p:spPr>
+        <p:style>
+          <a:lnRef idx="1">
+            <a:schemeClr val="accent1"/>
+          </a:lnRef>
+          <a:fillRef idx="0">
+            <a:schemeClr val="accent1"/>
+          </a:fillRef>
+          <a:effectRef idx="0">
+            <a:schemeClr val="accent1"/>
+          </a:effectRef>
+          <a:fontRef idx="minor">
+            <a:schemeClr val="tx1"/>
+          </a:fontRef>
+        </p:style>
+      </p:cxnSp>
+      <p:cxnSp>
+        <p:nvCxnSpPr>
+          <p:cNvPr id="35" name="Straight Arrow Connector 34">
+            <a:extLst>
+              <a:ext uri="{FF2B5EF4-FFF2-40B4-BE49-F238E27FC236}">
+                <a16:creationId xmlns:a16="http://schemas.microsoft.com/office/drawing/2014/main" id="{E8EAB06C-D347-8690-A166-0530FCA38EA2}"/>
+              </a:ext>
+            </a:extLst>
+          </p:cNvPr>
+          <p:cNvCxnSpPr>
+            <a:cxnSpLocks/>
+          </p:cNvCxnSpPr>
+          <p:nvPr/>
+        </p:nvCxnSpPr>
+        <p:spPr>
+          <a:xfrm flipV="1">
+            <a:off x="1271182" y="2584794"/>
+            <a:ext cx="1055080" cy="499301"/>
+          </a:xfrm>
+          <a:prstGeom prst="straightConnector1">
+            <a:avLst/>
+          </a:prstGeom>
+          <a:ln w="25400">
+            <a:solidFill>
+              <a:schemeClr val="tx1"/>
+            </a:solidFill>
+            <a:tailEnd type="triangle"/>
+          </a:ln>
+        </p:spPr>
+        <p:style>
+          <a:lnRef idx="1">
+            <a:schemeClr val="accent1"/>
+          </a:lnRef>
+          <a:fillRef idx="0">
+            <a:schemeClr val="accent1"/>
+          </a:fillRef>
+          <a:effectRef idx="0">
+            <a:schemeClr val="accent1"/>
+          </a:effectRef>
+          <a:fontRef idx="minor">
+            <a:schemeClr val="tx1"/>
+          </a:fontRef>
+        </p:style>
+      </p:cxnSp>
+      <p:graphicFrame>
+        <p:nvGraphicFramePr>
+          <p:cNvPr id="36" name="Object 35">
+            <a:extLst>
+              <a:ext uri="{FF2B5EF4-FFF2-40B4-BE49-F238E27FC236}">
+                <a16:creationId xmlns:a16="http://schemas.microsoft.com/office/drawing/2014/main" id="{986A56FB-12E5-4A13-0566-EDBE45A46E1B}"/>
+              </a:ext>
+            </a:extLst>
+          </p:cNvPr>
+          <p:cNvGraphicFramePr>
+            <a:graphicFrameLocks noChangeAspect="1"/>
+          </p:cNvGraphicFramePr>
+          <p:nvPr>
+            <p:extLst>
+              <p:ext uri="{D42A27DB-BD31-4B8C-83A1-F6EECF244321}">
+                <p14:modId xmlns:p14="http://schemas.microsoft.com/office/powerpoint/2010/main" val="1640875659"/>
+              </p:ext>
+            </p:extLst>
+          </p:nvPr>
+        </p:nvGraphicFramePr>
+        <p:xfrm>
+          <a:off x="3270440" y="2511464"/>
+          <a:ext cx="425876" cy="638815"/>
+        </p:xfrm>
+        <a:graphic>
+          <a:graphicData uri="http://schemas.openxmlformats.org/presentationml/2006/ole">
+            <mc:AlternateContent xmlns:mc="http://schemas.openxmlformats.org/markup-compatibility/2006">
+              <mc:Choice xmlns:v="urn:schemas-microsoft-com:vml" Requires="v">
+                <p:oleObj name="Equation" r:id="rId10" imgW="152280" imgH="228600" progId="Equation.DSMT4">
+                  <p:embed/>
+                </p:oleObj>
+              </mc:Choice>
+              <mc:Fallback>
+                <p:oleObj name="Equation" r:id="rId10" imgW="152280" imgH="228600" progId="Equation.DSMT4">
+                  <p:embed/>
+                  <p:pic>
+                    <p:nvPicPr>
+                      <p:cNvPr id="7" name="Object 6">
+                        <a:extLst>
+                          <a:ext uri="{FF2B5EF4-FFF2-40B4-BE49-F238E27FC236}">
+                            <a16:creationId xmlns:a16="http://schemas.microsoft.com/office/drawing/2014/main" id="{DEB4A4BE-6E00-089E-496B-0C1227C8BC89}"/>
+                          </a:ext>
+                        </a:extLst>
+                      </p:cNvPr>
+                      <p:cNvPicPr/>
+                      <p:nvPr/>
+                    </p:nvPicPr>
+                    <p:blipFill>
+                      <a:blip r:embed="rId11"/>
+                      <a:stretch>
+                        <a:fillRect/>
+                      </a:stretch>
+                    </p:blipFill>
+                    <p:spPr>
+                      <a:xfrm>
+                        <a:off x="3270440" y="2511464"/>
+                        <a:ext cx="425876" cy="638815"/>
+                      </a:xfrm>
+                      <a:prstGeom prst="rect">
+                        <a:avLst/>
+                      </a:prstGeom>
+                    </p:spPr>
+                  </p:pic>
+                </p:oleObj>
+              </mc:Fallback>
+            </mc:AlternateContent>
+          </a:graphicData>
+        </a:graphic>
+      </p:graphicFrame>
+      <p:sp>
+        <p:nvSpPr>
+          <p:cNvPr id="37" name="Rectangle 36">
+            <a:extLst>
+              <a:ext uri="{FF2B5EF4-FFF2-40B4-BE49-F238E27FC236}">
+                <a16:creationId xmlns:a16="http://schemas.microsoft.com/office/drawing/2014/main" id="{0624A9B4-E091-674C-5352-2EC9564A98C1}"/>
+              </a:ext>
+            </a:extLst>
+          </p:cNvPr>
+          <p:cNvSpPr/>
+          <p:nvPr/>
+        </p:nvSpPr>
+        <p:spPr>
+          <a:xfrm>
+            <a:off x="1288466" y="2888123"/>
+            <a:ext cx="211016" cy="190299"/>
+          </a:xfrm>
+          <a:prstGeom prst="rect">
+            <a:avLst/>
+          </a:prstGeom>
+          <a:noFill/>
+          <a:ln>
+            <a:solidFill>
+              <a:schemeClr val="accent1"/>
+            </a:solidFill>
+          </a:ln>
+        </p:spPr>
+        <p:style>
+          <a:lnRef idx="2">
+            <a:schemeClr val="accent1">
+              <a:shade val="15000"/>
+            </a:schemeClr>
+          </a:lnRef>
+          <a:fillRef idx="1">
+            <a:schemeClr val="accent1"/>
+          </a:fillRef>
+          <a:effectRef idx="0">
+            <a:schemeClr val="accent1"/>
+          </a:effectRef>
+          <a:fontRef idx="minor">
+            <a:schemeClr val="lt1"/>
+          </a:fontRef>
+        </p:style>
+        <p:txBody>
+          <a:bodyPr rtlCol="0" anchor="ctr"/>
+          <a:lstStyle/>
+          <a:p>
+            <a:pPr algn="ctr"/>
+            <a:endParaRPr lang="en-GB" dirty="0"/>
+          </a:p>
+        </p:txBody>
+      </p:sp>
+      <p:cxnSp>
+        <p:nvCxnSpPr>
+          <p:cNvPr id="39" name="Straight Arrow Connector 38">
+            <a:extLst>
+              <a:ext uri="{FF2B5EF4-FFF2-40B4-BE49-F238E27FC236}">
+                <a16:creationId xmlns:a16="http://schemas.microsoft.com/office/drawing/2014/main" id="{53FC2CB4-5B53-9778-EB40-600CE986DA17}"/>
+              </a:ext>
+            </a:extLst>
+          </p:cNvPr>
+          <p:cNvCxnSpPr>
+            <a:cxnSpLocks/>
+          </p:cNvCxnSpPr>
+          <p:nvPr/>
+        </p:nvCxnSpPr>
+        <p:spPr>
+          <a:xfrm flipV="1">
+            <a:off x="1284394" y="1560095"/>
+            <a:ext cx="0" cy="1524000"/>
+          </a:xfrm>
+          <a:prstGeom prst="straightConnector1">
+            <a:avLst/>
+          </a:prstGeom>
+          <a:ln w="25400">
+            <a:solidFill>
+              <a:schemeClr val="tx1"/>
+            </a:solidFill>
+            <a:tailEnd type="triangle"/>
+          </a:ln>
+        </p:spPr>
+        <p:style>
+          <a:lnRef idx="1">
+            <a:schemeClr val="accent1"/>
+          </a:lnRef>
+          <a:fillRef idx="0">
+            <a:schemeClr val="accent1"/>
+          </a:fillRef>
+          <a:effectRef idx="0">
+            <a:schemeClr val="accent1"/>
+          </a:effectRef>
+          <a:fontRef idx="minor">
+            <a:schemeClr val="tx1"/>
+          </a:fontRef>
+        </p:style>
+      </p:cxnSp>
+      <p:cxnSp>
+        <p:nvCxnSpPr>
+          <p:cNvPr id="41" name="Straight Arrow Connector 40">
+            <a:extLst>
+              <a:ext uri="{FF2B5EF4-FFF2-40B4-BE49-F238E27FC236}">
+                <a16:creationId xmlns:a16="http://schemas.microsoft.com/office/drawing/2014/main" id="{786A72F4-B8A0-0A78-0CF6-C753D34640DA}"/>
+              </a:ext>
+            </a:extLst>
+          </p:cNvPr>
+          <p:cNvCxnSpPr>
+            <a:cxnSpLocks/>
+          </p:cNvCxnSpPr>
+          <p:nvPr/>
+        </p:nvCxnSpPr>
+        <p:spPr>
+          <a:xfrm>
+            <a:off x="1317508" y="3084095"/>
+            <a:ext cx="1925053" cy="0"/>
+          </a:xfrm>
+          <a:prstGeom prst="straightConnector1">
+            <a:avLst/>
+          </a:prstGeom>
+          <a:ln w="25400">
+            <a:solidFill>
+              <a:schemeClr val="tx1"/>
+            </a:solidFill>
+            <a:tailEnd type="triangle"/>
+          </a:ln>
+        </p:spPr>
+        <p:style>
+          <a:lnRef idx="1">
+            <a:schemeClr val="accent1"/>
+          </a:lnRef>
+          <a:fillRef idx="0">
+            <a:schemeClr val="accent1"/>
+          </a:fillRef>
+          <a:effectRef idx="0">
+            <a:schemeClr val="accent1"/>
+          </a:effectRef>
+          <a:fontRef idx="minor">
+            <a:schemeClr val="tx1"/>
+          </a:fontRef>
+        </p:style>
+      </p:cxnSp>
+      <p:cxnSp>
+        <p:nvCxnSpPr>
+          <p:cNvPr id="42" name="Straight Arrow Connector 41">
+            <a:extLst>
+              <a:ext uri="{FF2B5EF4-FFF2-40B4-BE49-F238E27FC236}">
+                <a16:creationId xmlns:a16="http://schemas.microsoft.com/office/drawing/2014/main" id="{C4FAB652-B8A0-F577-1199-6E95E32F6F02}"/>
+              </a:ext>
+            </a:extLst>
+          </p:cNvPr>
+          <p:cNvCxnSpPr>
+            <a:cxnSpLocks/>
+          </p:cNvCxnSpPr>
+          <p:nvPr/>
+        </p:nvCxnSpPr>
+        <p:spPr>
+          <a:xfrm>
+            <a:off x="1271182" y="3084095"/>
+            <a:ext cx="2415381" cy="0"/>
+          </a:xfrm>
+          <a:prstGeom prst="straightConnector1">
+            <a:avLst/>
+          </a:prstGeom>
+          <a:ln w="25400">
+            <a:solidFill>
+              <a:schemeClr val="tx1"/>
+            </a:solidFill>
+            <a:tailEnd type="triangle"/>
+          </a:ln>
+        </p:spPr>
+        <p:style>
+          <a:lnRef idx="1">
+            <a:schemeClr val="accent1"/>
+          </a:lnRef>
+          <a:fillRef idx="0">
+            <a:schemeClr val="accent1"/>
+          </a:fillRef>
+          <a:effectRef idx="0">
+            <a:schemeClr val="accent1"/>
+          </a:effectRef>
+          <a:fontRef idx="minor">
+            <a:schemeClr val="tx1"/>
+          </a:fontRef>
+        </p:style>
+      </p:cxnSp>
+      <p:graphicFrame>
+        <p:nvGraphicFramePr>
+          <p:cNvPr id="43" name="Object 42">
+            <a:extLst>
+              <a:ext uri="{FF2B5EF4-FFF2-40B4-BE49-F238E27FC236}">
+                <a16:creationId xmlns:a16="http://schemas.microsoft.com/office/drawing/2014/main" id="{78129E1B-24FF-02B0-4FAE-FD994D791D74}"/>
+              </a:ext>
+            </a:extLst>
+          </p:cNvPr>
+          <p:cNvGraphicFramePr>
+            <a:graphicFrameLocks noChangeAspect="1"/>
+          </p:cNvGraphicFramePr>
+          <p:nvPr>
+            <p:extLst>
+              <p:ext uri="{D42A27DB-BD31-4B8C-83A1-F6EECF244321}">
+                <p14:modId xmlns:p14="http://schemas.microsoft.com/office/powerpoint/2010/main" val="1874723795"/>
+              </p:ext>
+            </p:extLst>
+          </p:nvPr>
+        </p:nvGraphicFramePr>
+        <p:xfrm>
+          <a:off x="1107491" y="2335265"/>
+          <a:ext cx="152400" cy="203200"/>
+        </p:xfrm>
+        <a:graphic>
+          <a:graphicData uri="http://schemas.openxmlformats.org/presentationml/2006/ole">
+            <mc:AlternateContent xmlns:mc="http://schemas.openxmlformats.org/markup-compatibility/2006">
+              <mc:Choice xmlns:v="urn:schemas-microsoft-com:vml" Requires="v">
+                <p:oleObj name="Equation" r:id="rId12" imgW="152280" imgH="203040" progId="Equation.DSMT4">
+                  <p:embed/>
+                </p:oleObj>
+              </mc:Choice>
+              <mc:Fallback>
+                <p:oleObj name="Equation" r:id="rId12" imgW="152280" imgH="203040" progId="Equation.DSMT4">
+                  <p:embed/>
+                  <p:pic>
+                    <p:nvPicPr>
+                      <p:cNvPr id="19" name="Object 18">
+                        <a:extLst>
+                          <a:ext uri="{FF2B5EF4-FFF2-40B4-BE49-F238E27FC236}">
+                            <a16:creationId xmlns:a16="http://schemas.microsoft.com/office/drawing/2014/main" id="{39E45B07-0E8E-71DB-3E00-AE1C6C6F8655}"/>
+                          </a:ext>
+                        </a:extLst>
+                      </p:cNvPr>
+                      <p:cNvPicPr/>
+                      <p:nvPr/>
+                    </p:nvPicPr>
+                    <p:blipFill>
+                      <a:blip r:embed="rId13"/>
+                      <a:stretch>
+                        <a:fillRect/>
+                      </a:stretch>
+                    </p:blipFill>
+                    <p:spPr>
+                      <a:xfrm>
+                        <a:off x="1107491" y="2335265"/>
+                        <a:ext cx="152400" cy="203200"/>
+                      </a:xfrm>
+                      <a:prstGeom prst="rect">
+                        <a:avLst/>
+                      </a:prstGeom>
+                    </p:spPr>
+                  </p:pic>
+                </p:oleObj>
+              </mc:Fallback>
+            </mc:AlternateContent>
+          </a:graphicData>
+        </a:graphic>
+      </p:graphicFrame>
+      <p:graphicFrame>
+        <p:nvGraphicFramePr>
+          <p:cNvPr id="44" name="Object 43">
+            <a:extLst>
+              <a:ext uri="{FF2B5EF4-FFF2-40B4-BE49-F238E27FC236}">
+                <a16:creationId xmlns:a16="http://schemas.microsoft.com/office/drawing/2014/main" id="{FDF2F1CC-1033-776C-10E6-96D2FF1D38CD}"/>
+              </a:ext>
+            </a:extLst>
+          </p:cNvPr>
+          <p:cNvGraphicFramePr>
+            <a:graphicFrameLocks noChangeAspect="1"/>
+          </p:cNvGraphicFramePr>
+          <p:nvPr>
+            <p:extLst>
+              <p:ext uri="{D42A27DB-BD31-4B8C-83A1-F6EECF244321}">
+                <p14:modId xmlns:p14="http://schemas.microsoft.com/office/powerpoint/2010/main" val="79647267"/>
+              </p:ext>
+            </p:extLst>
+          </p:nvPr>
+        </p:nvGraphicFramePr>
+        <p:xfrm>
+          <a:off x="1739226" y="3175689"/>
+          <a:ext cx="165100" cy="203200"/>
+        </p:xfrm>
+        <a:graphic>
+          <a:graphicData uri="http://schemas.openxmlformats.org/presentationml/2006/ole">
+            <mc:AlternateContent xmlns:mc="http://schemas.openxmlformats.org/markup-compatibility/2006">
+              <mc:Choice xmlns:v="urn:schemas-microsoft-com:vml" Requires="v">
+                <p:oleObj name="Equation" r:id="rId14" imgW="164880" imgH="203040" progId="Equation.DSMT4">
+                  <p:embed/>
+                </p:oleObj>
+              </mc:Choice>
+              <mc:Fallback>
+                <p:oleObj name="Equation" r:id="rId14" imgW="164880" imgH="203040" progId="Equation.DSMT4">
+                  <p:embed/>
+                  <p:pic>
+                    <p:nvPicPr>
+                      <p:cNvPr id="20" name="Object 19">
+                        <a:extLst>
+                          <a:ext uri="{FF2B5EF4-FFF2-40B4-BE49-F238E27FC236}">
+                            <a16:creationId xmlns:a16="http://schemas.microsoft.com/office/drawing/2014/main" id="{5943B85C-EE42-6EB5-07BF-2E668310DBEF}"/>
+                          </a:ext>
+                        </a:extLst>
+                      </p:cNvPr>
+                      <p:cNvPicPr/>
+                      <p:nvPr/>
+                    </p:nvPicPr>
+                    <p:blipFill>
+                      <a:blip r:embed="rId15"/>
+                      <a:stretch>
+                        <a:fillRect/>
+                      </a:stretch>
+                    </p:blipFill>
+                    <p:spPr>
+                      <a:xfrm>
+                        <a:off x="1739226" y="3175689"/>
+                        <a:ext cx="165100" cy="203200"/>
+                      </a:xfrm>
+                      <a:prstGeom prst="rect">
+                        <a:avLst/>
+                      </a:prstGeom>
+                    </p:spPr>
+                  </p:pic>
+                </p:oleObj>
+              </mc:Fallback>
+            </mc:AlternateContent>
+          </a:graphicData>
+        </a:graphic>
+      </p:graphicFrame>
+      <p:graphicFrame>
+        <p:nvGraphicFramePr>
+          <p:cNvPr id="45" name="Object 44">
+            <a:extLst>
+              <a:ext uri="{FF2B5EF4-FFF2-40B4-BE49-F238E27FC236}">
+                <a16:creationId xmlns:a16="http://schemas.microsoft.com/office/drawing/2014/main" id="{23EC7249-16EB-0251-1C32-AE885078CF08}"/>
+              </a:ext>
+            </a:extLst>
+          </p:cNvPr>
+          <p:cNvGraphicFramePr>
+            <a:graphicFrameLocks noChangeAspect="1"/>
+          </p:cNvGraphicFramePr>
+          <p:nvPr>
+            <p:extLst>
+              <p:ext uri="{D42A27DB-BD31-4B8C-83A1-F6EECF244321}">
+                <p14:modId xmlns:p14="http://schemas.microsoft.com/office/powerpoint/2010/main" val="43192710"/>
+              </p:ext>
+            </p:extLst>
+          </p:nvPr>
+        </p:nvGraphicFramePr>
+        <p:xfrm>
+          <a:off x="1399891" y="2623719"/>
+          <a:ext cx="508000" cy="204299"/>
+        </p:xfrm>
+        <a:graphic>
+          <a:graphicData uri="http://schemas.openxmlformats.org/presentationml/2006/ole">
+            <mc:AlternateContent xmlns:mc="http://schemas.openxmlformats.org/markup-compatibility/2006">
+              <mc:Choice xmlns:v="urn:schemas-microsoft-com:vml" Requires="v">
+                <p:oleObj name="Equation" r:id="rId18" imgW="507960" imgH="203040" progId="Equation.DSMT4">
+                  <p:embed/>
+                </p:oleObj>
+              </mc:Choice>
+              <mc:Fallback>
+                <p:oleObj name="Equation" r:id="rId18" imgW="507960" imgH="203040" progId="Equation.DSMT4">
+                  <p:embed/>
+                  <p:pic>
+                    <p:nvPicPr>
+                      <p:cNvPr id="21" name="Object 20">
+                        <a:extLst>
+                          <a:ext uri="{FF2B5EF4-FFF2-40B4-BE49-F238E27FC236}">
+                            <a16:creationId xmlns:a16="http://schemas.microsoft.com/office/drawing/2014/main" id="{AADBE3B0-0071-78D7-21C8-2C98711DB58F}"/>
+                          </a:ext>
+                        </a:extLst>
+                      </p:cNvPr>
+                      <p:cNvPicPr/>
+                      <p:nvPr/>
+                    </p:nvPicPr>
+                    <p:blipFill>
+                      <a:blip r:embed="rId19"/>
+                      <a:stretch>
+                        <a:fillRect/>
+                      </a:stretch>
+                    </p:blipFill>
+                    <p:spPr>
+                      <a:xfrm>
+                        <a:off x="1399891" y="2623719"/>
+                        <a:ext cx="508000" cy="204299"/>
+                      </a:xfrm>
+                      <a:prstGeom prst="rect">
+                        <a:avLst/>
+                      </a:prstGeom>
+                    </p:spPr>
+                  </p:pic>
+                </p:oleObj>
+              </mc:Fallback>
+            </mc:AlternateContent>
+          </a:graphicData>
+        </a:graphic>
+      </p:graphicFrame>
+      <p:sp>
+        <p:nvSpPr>
+          <p:cNvPr id="48" name="TextBox 47">
+            <a:extLst>
+              <a:ext uri="{FF2B5EF4-FFF2-40B4-BE49-F238E27FC236}">
+                <a16:creationId xmlns:a16="http://schemas.microsoft.com/office/drawing/2014/main" id="{43F8AADC-77E8-4C2F-0F51-595109A463A1}"/>
+              </a:ext>
+            </a:extLst>
+          </p:cNvPr>
+          <p:cNvSpPr txBox="1"/>
+          <p:nvPr/>
+        </p:nvSpPr>
+        <p:spPr>
+          <a:xfrm>
+            <a:off x="1218774" y="1002779"/>
+            <a:ext cx="4078504" cy="369332"/>
+          </a:xfrm>
+          <a:prstGeom prst="rect">
+            <a:avLst/>
+          </a:prstGeom>
+          <a:noFill/>
+        </p:spPr>
+        <p:txBody>
+          <a:bodyPr wrap="square" rtlCol="0">
+            <a:spAutoFit/>
+          </a:bodyPr>
+          <a:lstStyle/>
+          <a:p>
+            <a:r>
+              <a:rPr lang="en-GB" dirty="0"/>
+              <a:t>Orthogonal lattice</a:t>
+            </a:r>
+          </a:p>
+        </p:txBody>
+      </p:sp>
+      <p:sp>
+        <p:nvSpPr>
+          <p:cNvPr id="49" name="TextBox 48">
+            <a:extLst>
+              <a:ext uri="{FF2B5EF4-FFF2-40B4-BE49-F238E27FC236}">
+                <a16:creationId xmlns:a16="http://schemas.microsoft.com/office/drawing/2014/main" id="{FD500CC8-BE64-8D7B-E3E7-049CC41119ED}"/>
+              </a:ext>
+            </a:extLst>
+          </p:cNvPr>
+          <p:cNvSpPr txBox="1"/>
+          <p:nvPr/>
+        </p:nvSpPr>
+        <p:spPr>
+          <a:xfrm>
+            <a:off x="4764000" y="1002779"/>
+            <a:ext cx="3119023" cy="369332"/>
+          </a:xfrm>
+          <a:prstGeom prst="rect">
+            <a:avLst/>
+          </a:prstGeom>
+          <a:noFill/>
+        </p:spPr>
+        <p:txBody>
+          <a:bodyPr wrap="square" rtlCol="0">
+            <a:spAutoFit/>
+          </a:bodyPr>
+          <a:lstStyle/>
+          <a:p>
+            <a:r>
+              <a:rPr lang="en-GB" dirty="0"/>
+              <a:t>Non-orthogonal lattice</a:t>
+            </a:r>
+          </a:p>
+        </p:txBody>
+      </p:sp>
     </p:spTree>
     <p:extLst>
       <p:ext uri="{BB962C8B-B14F-4D97-AF65-F5344CB8AC3E}">

</xml_diff>

<commit_message>
Re #1549 Hopefully better image
</commit_message>
<xml_diff>
--- a/documentation/user_docs/docs/images/Spherical_Coordinates_fig_source.pptx
+++ b/documentation/user_docs/docs/images/Spherical_Coordinates_fig_source.pptx
@@ -3347,57 +3347,6 @@
           <a:chExt cx="0" cy="0"/>
         </a:xfrm>
       </p:grpSpPr>
-      <p:sp>
-        <p:nvSpPr>
-          <p:cNvPr id="12" name="Arc 11">
-            <a:extLst>
-              <a:ext uri="{FF2B5EF4-FFF2-40B4-BE49-F238E27FC236}">
-                <a16:creationId xmlns:a16="http://schemas.microsoft.com/office/drawing/2014/main" id="{0FAF3754-F346-D9DD-B75F-91778A106BC0}"/>
-              </a:ext>
-            </a:extLst>
-          </p:cNvPr>
-          <p:cNvSpPr/>
-          <p:nvPr/>
-        </p:nvSpPr>
-        <p:spPr>
-          <a:xfrm>
-            <a:off x="4524083" y="2577604"/>
-            <a:ext cx="492270" cy="620170"/>
-          </a:xfrm>
-          <a:prstGeom prst="arc">
-            <a:avLst>
-              <a:gd name="adj1" fmla="val 15761876"/>
-              <a:gd name="adj2" fmla="val 1868746"/>
-            </a:avLst>
-          </a:prstGeom>
-          <a:ln>
-            <a:headEnd type="stealth"/>
-            <a:tailEnd type="stealth"/>
-          </a:ln>
-        </p:spPr>
-        <p:style>
-          <a:lnRef idx="1">
-            <a:schemeClr val="accent1"/>
-          </a:lnRef>
-          <a:fillRef idx="0">
-            <a:schemeClr val="accent1"/>
-          </a:fillRef>
-          <a:effectRef idx="0">
-            <a:schemeClr val="accent1"/>
-          </a:effectRef>
-          <a:fontRef idx="minor">
-            <a:schemeClr val="tx1"/>
-          </a:fontRef>
-        </p:style>
-        <p:txBody>
-          <a:bodyPr rtlCol="0" anchor="ctr"/>
-          <a:lstStyle/>
-          <a:p>
-            <a:pPr algn="ctr"/>
-            <a:endParaRPr lang="en-GB" dirty="0"/>
-          </a:p>
-        </p:txBody>
-      </p:sp>
       <p:cxnSp>
         <p:nvCxnSpPr>
           <p:cNvPr id="14" name="Straight Arrow Connector 13">
@@ -3609,13 +3558,13 @@
           <p:nvPr>
             <p:extLst>
               <p:ext uri="{D42A27DB-BD31-4B8C-83A1-F6EECF244321}">
-                <p14:modId xmlns:p14="http://schemas.microsoft.com/office/powerpoint/2010/main" val="3190657963"/>
+                <p14:modId xmlns:p14="http://schemas.microsoft.com/office/powerpoint/2010/main" val="135559067"/>
               </p:ext>
             </p:extLst>
           </p:nvPr>
         </p:nvGraphicFramePr>
         <p:xfrm>
-          <a:off x="6383957" y="2907287"/>
+          <a:off x="6312289" y="2726557"/>
           <a:ext cx="390525" cy="638175"/>
         </p:xfrm>
         <a:graphic>
@@ -3649,7 +3598,7 @@
                     </p:blipFill>
                     <p:spPr>
                       <a:xfrm>
-                        <a:off x="6383957" y="2907287"/>
+                        <a:off x="6312289" y="2726557"/>
                         <a:ext cx="390525" cy="638175"/>
                       </a:xfrm>
                       <a:prstGeom prst="rect">
@@ -3687,6 +3636,9 @@
             </a:avLst>
           </a:prstGeom>
           <a:ln>
+            <a:solidFill>
+              <a:srgbClr val="0D1EFB"/>
+            </a:solidFill>
             <a:headEnd type="stealth"/>
             <a:tailEnd type="stealth"/>
           </a:ln>
@@ -3727,19 +3679,22 @@
           <p:nvPr/>
         </p:nvSpPr>
         <p:spPr>
-          <a:xfrm rot="2626853">
-            <a:off x="5299658" y="2738120"/>
-            <a:ext cx="439243" cy="432633"/>
+          <a:xfrm rot="1809793">
+            <a:off x="5342001" y="2755820"/>
+            <a:ext cx="516954" cy="501501"/>
           </a:xfrm>
           <a:prstGeom prst="arc">
             <a:avLst>
-              <a:gd name="adj1" fmla="val 15367859"/>
-              <a:gd name="adj2" fmla="val 20252165"/>
+              <a:gd name="adj1" fmla="val 14886939"/>
+              <a:gd name="adj2" fmla="val 21237981"/>
             </a:avLst>
           </a:prstGeom>
           <a:ln>
+            <a:solidFill>
+              <a:srgbClr val="0D1EFB"/>
+            </a:solidFill>
             <a:headEnd type="stealth"/>
-            <a:tailEnd type="diamond"/>
+            <a:tailEnd type="stealth"/>
           </a:ln>
         </p:spPr>
         <p:style>
@@ -3849,13 +3804,13 @@
           <p:nvPr>
             <p:extLst>
               <p:ext uri="{D42A27DB-BD31-4B8C-83A1-F6EECF244321}">
-                <p14:modId xmlns:p14="http://schemas.microsoft.com/office/powerpoint/2010/main" val="2971038521"/>
+                <p14:modId xmlns:p14="http://schemas.microsoft.com/office/powerpoint/2010/main" val="1677993651"/>
               </p:ext>
             </p:extLst>
           </p:nvPr>
         </p:nvGraphicFramePr>
         <p:xfrm>
-          <a:off x="5755985" y="2877813"/>
+          <a:off x="5818196" y="2688752"/>
           <a:ext cx="354012" cy="444500"/>
         </p:xfrm>
         <a:graphic>
@@ -3889,7 +3844,7 @@
                     </p:blipFill>
                     <p:spPr>
                       <a:xfrm>
-                        <a:off x="5755985" y="2877813"/>
+                        <a:off x="5818196" y="2688752"/>
                         <a:ext cx="354012" cy="444500"/>
                       </a:xfrm>
                       <a:prstGeom prst="rect">
@@ -3919,8 +3874,8 @@
         </p:nvCxnSpPr>
         <p:spPr>
           <a:xfrm flipV="1">
-            <a:off x="5801353" y="2648420"/>
-            <a:ext cx="552117" cy="259563"/>
+            <a:off x="5531525" y="2648420"/>
+            <a:ext cx="821945" cy="387640"/>
           </a:xfrm>
           <a:prstGeom prst="straightConnector1">
             <a:avLst/>
@@ -4106,229 +4061,6 @@
           </a:graphicData>
         </a:graphic>
       </p:graphicFrame>
-      <p:sp>
-        <p:nvSpPr>
-          <p:cNvPr id="11" name="Rectangle 10">
-            <a:extLst>
-              <a:ext uri="{FF2B5EF4-FFF2-40B4-BE49-F238E27FC236}">
-                <a16:creationId xmlns:a16="http://schemas.microsoft.com/office/drawing/2014/main" id="{762F8A39-E673-4C5B-3F86-447CCF17AF3A}"/>
-              </a:ext>
-            </a:extLst>
-          </p:cNvPr>
-          <p:cNvSpPr/>
-          <p:nvPr/>
-        </p:nvSpPr>
-        <p:spPr>
-          <a:xfrm>
-            <a:off x="4752318" y="2710897"/>
-            <a:ext cx="211016" cy="190299"/>
-          </a:xfrm>
-          <a:prstGeom prst="rect">
-            <a:avLst/>
-          </a:prstGeom>
-          <a:noFill/>
-          <a:ln>
-            <a:solidFill>
-              <a:schemeClr val="accent1"/>
-            </a:solidFill>
-          </a:ln>
-        </p:spPr>
-        <p:style>
-          <a:lnRef idx="2">
-            <a:schemeClr val="accent1">
-              <a:shade val="15000"/>
-            </a:schemeClr>
-          </a:lnRef>
-          <a:fillRef idx="1">
-            <a:schemeClr val="accent1"/>
-          </a:fillRef>
-          <a:effectRef idx="0">
-            <a:schemeClr val="accent1"/>
-          </a:effectRef>
-          <a:fontRef idx="minor">
-            <a:schemeClr val="lt1"/>
-          </a:fontRef>
-        </p:style>
-        <p:txBody>
-          <a:bodyPr rtlCol="0" anchor="ctr"/>
-          <a:lstStyle/>
-          <a:p>
-            <a:pPr algn="ctr"/>
-            <a:endParaRPr lang="en-GB" dirty="0"/>
-          </a:p>
-        </p:txBody>
-      </p:sp>
-      <p:cxnSp>
-        <p:nvCxnSpPr>
-          <p:cNvPr id="5" name="Straight Arrow Connector 4">
-            <a:extLst>
-              <a:ext uri="{FF2B5EF4-FFF2-40B4-BE49-F238E27FC236}">
-                <a16:creationId xmlns:a16="http://schemas.microsoft.com/office/drawing/2014/main" id="{15FF7220-F7F3-2ECA-61DE-85BFED7D5F7A}"/>
-              </a:ext>
-            </a:extLst>
-          </p:cNvPr>
-          <p:cNvCxnSpPr>
-            <a:cxnSpLocks/>
-          </p:cNvCxnSpPr>
-          <p:nvPr/>
-        </p:nvCxnSpPr>
-        <p:spPr>
-          <a:xfrm flipV="1">
-            <a:off x="4748246" y="1382869"/>
-            <a:ext cx="0" cy="1524000"/>
-          </a:xfrm>
-          <a:prstGeom prst="straightConnector1">
-            <a:avLst/>
-          </a:prstGeom>
-          <a:ln w="25400">
-            <a:solidFill>
-              <a:schemeClr val="tx1"/>
-            </a:solidFill>
-            <a:tailEnd type="triangle"/>
-          </a:ln>
-        </p:spPr>
-        <p:style>
-          <a:lnRef idx="1">
-            <a:schemeClr val="accent1"/>
-          </a:lnRef>
-          <a:fillRef idx="0">
-            <a:schemeClr val="accent1"/>
-          </a:fillRef>
-          <a:effectRef idx="0">
-            <a:schemeClr val="accent1"/>
-          </a:effectRef>
-          <a:fontRef idx="minor">
-            <a:schemeClr val="tx1"/>
-          </a:fontRef>
-        </p:style>
-      </p:cxnSp>
-      <p:cxnSp>
-        <p:nvCxnSpPr>
-          <p:cNvPr id="15" name="Straight Connector 14">
-            <a:extLst>
-              <a:ext uri="{FF2B5EF4-FFF2-40B4-BE49-F238E27FC236}">
-                <a16:creationId xmlns:a16="http://schemas.microsoft.com/office/drawing/2014/main" id="{B75C8C82-C052-4A81-7624-F3A36A89DFF6}"/>
-              </a:ext>
-            </a:extLst>
-          </p:cNvPr>
-          <p:cNvCxnSpPr>
-            <a:cxnSpLocks/>
-          </p:cNvCxnSpPr>
-          <p:nvPr/>
-        </p:nvCxnSpPr>
-        <p:spPr>
-          <a:xfrm>
-            <a:off x="4962917" y="2791593"/>
-            <a:ext cx="0" cy="204064"/>
-          </a:xfrm>
-          <a:prstGeom prst="line">
-            <a:avLst/>
-          </a:prstGeom>
-          <a:ln w="12700"/>
-        </p:spPr>
-        <p:style>
-          <a:lnRef idx="1">
-            <a:schemeClr val="accent1"/>
-          </a:lnRef>
-          <a:fillRef idx="0">
-            <a:schemeClr val="accent1"/>
-          </a:fillRef>
-          <a:effectRef idx="0">
-            <a:schemeClr val="accent1"/>
-          </a:effectRef>
-          <a:fontRef idx="minor">
-            <a:schemeClr val="tx1"/>
-          </a:fontRef>
-        </p:style>
-      </p:cxnSp>
-      <p:cxnSp>
-        <p:nvCxnSpPr>
-          <p:cNvPr id="8" name="Straight Arrow Connector 7">
-            <a:extLst>
-              <a:ext uri="{FF2B5EF4-FFF2-40B4-BE49-F238E27FC236}">
-                <a16:creationId xmlns:a16="http://schemas.microsoft.com/office/drawing/2014/main" id="{B060E5C9-E833-A705-51FD-7117DBFD3F84}"/>
-              </a:ext>
-            </a:extLst>
-          </p:cNvPr>
-          <p:cNvCxnSpPr>
-            <a:cxnSpLocks/>
-          </p:cNvCxnSpPr>
-          <p:nvPr/>
-        </p:nvCxnSpPr>
-        <p:spPr>
-          <a:xfrm>
-            <a:off x="4781360" y="2906869"/>
-            <a:ext cx="1925053" cy="0"/>
-          </a:xfrm>
-          <a:prstGeom prst="straightConnector1">
-            <a:avLst/>
-          </a:prstGeom>
-          <a:ln w="25400">
-            <a:solidFill>
-              <a:schemeClr val="tx1"/>
-            </a:solidFill>
-            <a:tailEnd type="triangle"/>
-          </a:ln>
-        </p:spPr>
-        <p:style>
-          <a:lnRef idx="1">
-            <a:schemeClr val="accent1"/>
-          </a:lnRef>
-          <a:fillRef idx="0">
-            <a:schemeClr val="accent1"/>
-          </a:fillRef>
-          <a:effectRef idx="0">
-            <a:schemeClr val="accent1"/>
-          </a:effectRef>
-          <a:fontRef idx="minor">
-            <a:schemeClr val="tx1"/>
-          </a:fontRef>
-        </p:style>
-      </p:cxnSp>
-      <p:cxnSp>
-        <p:nvCxnSpPr>
-          <p:cNvPr id="2" name="Straight Arrow Connector 1">
-            <a:extLst>
-              <a:ext uri="{FF2B5EF4-FFF2-40B4-BE49-F238E27FC236}">
-                <a16:creationId xmlns:a16="http://schemas.microsoft.com/office/drawing/2014/main" id="{BB74D303-3253-B62B-9E8B-F20B7B51845B}"/>
-              </a:ext>
-            </a:extLst>
-          </p:cNvPr>
-          <p:cNvCxnSpPr>
-            <a:cxnSpLocks/>
-          </p:cNvCxnSpPr>
-          <p:nvPr/>
-        </p:nvCxnSpPr>
-        <p:spPr>
-          <a:xfrm>
-            <a:off x="4735034" y="2906869"/>
-            <a:ext cx="1842599" cy="768006"/>
-          </a:xfrm>
-          <a:prstGeom prst="straightConnector1">
-            <a:avLst/>
-          </a:prstGeom>
-          <a:ln w="25400">
-            <a:solidFill>
-              <a:schemeClr val="tx1"/>
-            </a:solidFill>
-            <a:tailEnd type="triangle"/>
-          </a:ln>
-        </p:spPr>
-        <p:style>
-          <a:lnRef idx="1">
-            <a:schemeClr val="accent1"/>
-          </a:lnRef>
-          <a:fillRef idx="0">
-            <a:schemeClr val="accent1"/>
-          </a:fillRef>
-          <a:effectRef idx="0">
-            <a:schemeClr val="accent1"/>
-          </a:effectRef>
-          <a:fontRef idx="minor">
-            <a:schemeClr val="tx1"/>
-          </a:fontRef>
-        </p:style>
-      </p:cxnSp>
       <p:graphicFrame>
         <p:nvGraphicFramePr>
           <p:cNvPr id="19" name="Object 18">
@@ -4344,13 +4076,13 @@
           <p:nvPr>
             <p:extLst>
               <p:ext uri="{D42A27DB-BD31-4B8C-83A1-F6EECF244321}">
-                <p14:modId xmlns:p14="http://schemas.microsoft.com/office/powerpoint/2010/main" val="2042498566"/>
+                <p14:modId xmlns:p14="http://schemas.microsoft.com/office/powerpoint/2010/main" val="527649718"/>
               </p:ext>
             </p:extLst>
           </p:nvPr>
         </p:nvGraphicFramePr>
         <p:xfrm>
-          <a:off x="4571343" y="2158039"/>
+          <a:off x="4557604" y="1990194"/>
           <a:ext cx="152400" cy="203200"/>
         </p:xfrm>
         <a:graphic>
@@ -4378,7 +4110,7 @@
                     </p:blipFill>
                     <p:spPr>
                       <a:xfrm>
-                        <a:off x="4571343" y="2158039"/>
+                        <a:off x="4557604" y="1990194"/>
                         <a:ext cx="152400" cy="203200"/>
                       </a:xfrm>
                       <a:prstGeom prst="rect">
@@ -4407,13 +4139,13 @@
           <p:nvPr>
             <p:extLst>
               <p:ext uri="{D42A27DB-BD31-4B8C-83A1-F6EECF244321}">
-                <p14:modId xmlns:p14="http://schemas.microsoft.com/office/powerpoint/2010/main" val="1183454284"/>
+                <p14:modId xmlns:p14="http://schemas.microsoft.com/office/powerpoint/2010/main" val="3130659989"/>
               </p:ext>
             </p:extLst>
           </p:nvPr>
         </p:nvGraphicFramePr>
         <p:xfrm>
-          <a:off x="5360019" y="3229549"/>
+          <a:off x="5440478" y="3243614"/>
           <a:ext cx="165100" cy="203200"/>
         </p:xfrm>
         <a:graphic>
@@ -4447,7 +4179,7 @@
                     </p:blipFill>
                     <p:spPr>
                       <a:xfrm>
-                        <a:off x="5360019" y="3229549"/>
+                        <a:off x="5440478" y="3243614"/>
                         <a:ext cx="165100" cy="203200"/>
                       </a:xfrm>
                       <a:prstGeom prst="rect">
@@ -4461,75 +4193,6 @@
           </a:graphicData>
         </a:graphic>
       </p:graphicFrame>
-      <p:graphicFrame>
-        <p:nvGraphicFramePr>
-          <p:cNvPr id="21" name="Object 20">
-            <a:extLst>
-              <a:ext uri="{FF2B5EF4-FFF2-40B4-BE49-F238E27FC236}">
-                <a16:creationId xmlns:a16="http://schemas.microsoft.com/office/drawing/2014/main" id="{AADBE3B0-0071-78D7-21C8-2C98711DB58F}"/>
-              </a:ext>
-            </a:extLst>
-          </p:cNvPr>
-          <p:cNvGraphicFramePr>
-            <a:graphicFrameLocks noChangeAspect="1"/>
-          </p:cNvGraphicFramePr>
-          <p:nvPr>
-            <p:extLst>
-              <p:ext uri="{D42A27DB-BD31-4B8C-83A1-F6EECF244321}">
-                <p14:modId xmlns:p14="http://schemas.microsoft.com/office/powerpoint/2010/main" val="3405083100"/>
-              </p:ext>
-            </p:extLst>
-          </p:nvPr>
-        </p:nvGraphicFramePr>
-        <p:xfrm>
-          <a:off x="4832204" y="2430515"/>
-          <a:ext cx="190500" cy="203200"/>
-        </p:xfrm>
-        <a:graphic>
-          <a:graphicData uri="http://schemas.openxmlformats.org/presentationml/2006/ole">
-            <mc:AlternateContent xmlns:mc="http://schemas.openxmlformats.org/markup-compatibility/2006">
-              <mc:Choice xmlns:v="urn:schemas-microsoft-com:vml" Requires="v">
-                <p:oleObj name="Equation" r:id="rId16" imgW="190440" imgH="203040" progId="Equation.DSMT4">
-                  <p:embed/>
-                </p:oleObj>
-              </mc:Choice>
-              <mc:Fallback>
-                <p:oleObj name="Equation" r:id="rId16" imgW="190440" imgH="203040" progId="Equation.DSMT4">
-                  <p:embed/>
-                  <p:pic>
-                    <p:nvPicPr>
-                      <p:cNvPr id="20" name="Object 19">
-                        <a:extLst>
-                          <a:ext uri="{FF2B5EF4-FFF2-40B4-BE49-F238E27FC236}">
-                            <a16:creationId xmlns:a16="http://schemas.microsoft.com/office/drawing/2014/main" id="{5943B85C-EE42-6EB5-07BF-2E668310DBEF}"/>
-                          </a:ext>
-                        </a:extLst>
-                      </p:cNvPr>
-                      <p:cNvPicPr/>
-                      <p:nvPr/>
-                    </p:nvPicPr>
-                    <p:blipFill>
-                      <a:blip r:embed="rId17"/>
-                      <a:stretch>
-                        <a:fillRect/>
-                      </a:stretch>
-                    </p:blipFill>
-                    <p:spPr>
-                      <a:xfrm>
-                        <a:off x="4832204" y="2430515"/>
-                        <a:ext cx="190500" cy="203200"/>
-                      </a:xfrm>
-                      <a:prstGeom prst="rect">
-                        <a:avLst/>
-                      </a:prstGeom>
-                    </p:spPr>
-                  </p:pic>
-                </p:oleObj>
-              </mc:Fallback>
-            </mc:AlternateContent>
-          </a:graphicData>
-        </a:graphic>
-      </p:graphicFrame>
       <p:sp>
         <p:nvSpPr>
           <p:cNvPr id="3" name="Arc 2">
@@ -4544,18 +4207,21 @@
         </p:nvSpPr>
         <p:spPr>
           <a:xfrm>
-            <a:off x="1060231" y="2754830"/>
-            <a:ext cx="492270" cy="620170"/>
+            <a:off x="965711" y="2769592"/>
+            <a:ext cx="655198" cy="619590"/>
           </a:xfrm>
           <a:prstGeom prst="arc">
             <a:avLst>
-              <a:gd name="adj1" fmla="val 15761876"/>
-              <a:gd name="adj2" fmla="val 497198"/>
+              <a:gd name="adj1" fmla="val 16249545"/>
+              <a:gd name="adj2" fmla="val 21589063"/>
             </a:avLst>
           </a:prstGeom>
           <a:ln>
-            <a:headEnd type="stealth"/>
-            <a:tailEnd type="stealth"/>
+            <a:solidFill>
+              <a:srgbClr val="00B050"/>
+            </a:solidFill>
+            <a:headEnd type="none"/>
+            <a:tailEnd type="none"/>
           </a:ln>
         </p:spPr>
         <p:style>
@@ -4686,7 +4352,7 @@
         </p:nvCxnSpPr>
         <p:spPr>
           <a:xfrm flipV="1">
-            <a:off x="1284394" y="2823529"/>
+            <a:off x="1277159" y="2823528"/>
             <a:ext cx="1618436" cy="260566"/>
           </a:xfrm>
           <a:prstGeom prst="straightConnector1">
@@ -4866,13 +4532,13 @@
         </p:nvSpPr>
         <p:spPr>
           <a:xfrm>
-            <a:off x="920447" y="2322100"/>
-            <a:ext cx="794122" cy="621542"/>
+            <a:off x="920446" y="1973111"/>
+            <a:ext cx="927813" cy="970531"/>
           </a:xfrm>
           <a:prstGeom prst="arc">
             <a:avLst>
-              <a:gd name="adj1" fmla="val 15867340"/>
-              <a:gd name="adj2" fmla="val 21530292"/>
+              <a:gd name="adj1" fmla="val 15571942"/>
+              <a:gd name="adj2" fmla="val 274833"/>
             </a:avLst>
           </a:prstGeom>
           <a:ln>
@@ -4917,8 +4583,8 @@
         </p:nvSpPr>
         <p:spPr>
           <a:xfrm rot="2626853">
-            <a:off x="1835806" y="2915346"/>
-            <a:ext cx="439243" cy="432633"/>
+            <a:off x="2372645" y="2827363"/>
+            <a:ext cx="443607" cy="353360"/>
           </a:xfrm>
           <a:prstGeom prst="arc">
             <a:avLst>
@@ -4927,8 +4593,11 @@
             </a:avLst>
           </a:prstGeom>
           <a:ln>
+            <a:solidFill>
+              <a:srgbClr val="0D1EFB"/>
+            </a:solidFill>
             <a:headEnd type="stealth"/>
-            <a:tailEnd type="diamond"/>
+            <a:tailEnd type="stealth"/>
           </a:ln>
         </p:spPr>
         <p:style>
@@ -4969,13 +4638,13 @@
           <p:nvPr>
             <p:extLst>
               <p:ext uri="{D42A27DB-BD31-4B8C-83A1-F6EECF244321}">
-                <p14:modId xmlns:p14="http://schemas.microsoft.com/office/powerpoint/2010/main" val="193055852"/>
+                <p14:modId xmlns:p14="http://schemas.microsoft.com/office/powerpoint/2010/main" val="3207158677"/>
               </p:ext>
             </p:extLst>
           </p:nvPr>
         </p:nvGraphicFramePr>
         <p:xfrm>
-          <a:off x="1499065" y="2031195"/>
+          <a:off x="1683934" y="1668024"/>
           <a:ext cx="354012" cy="388896"/>
         </p:xfrm>
         <a:graphic>
@@ -5009,7 +4678,7 @@
                     </p:blipFill>
                     <p:spPr>
                       <a:xfrm>
-                        <a:off x="1499065" y="2031195"/>
+                        <a:off x="1683934" y="1668024"/>
                         <a:ext cx="354012" cy="388896"/>
                       </a:xfrm>
                       <a:prstGeom prst="rect">
@@ -5038,13 +4707,13 @@
           <p:nvPr>
             <p:extLst>
               <p:ext uri="{D42A27DB-BD31-4B8C-83A1-F6EECF244321}">
-                <p14:modId xmlns:p14="http://schemas.microsoft.com/office/powerpoint/2010/main" val="4084343584"/>
+                <p14:modId xmlns:p14="http://schemas.microsoft.com/office/powerpoint/2010/main" val="872277222"/>
               </p:ext>
             </p:extLst>
           </p:nvPr>
         </p:nvGraphicFramePr>
         <p:xfrm>
-          <a:off x="2292133" y="3055039"/>
+          <a:off x="2893936" y="2674756"/>
           <a:ext cx="354012" cy="444500"/>
         </p:xfrm>
         <a:graphic>
@@ -5078,7 +4747,7 @@
                     </p:blipFill>
                     <p:spPr>
                       <a:xfrm>
-                        <a:off x="2292133" y="3055039"/>
+                        <a:off x="2893936" y="2674756"/>
                         <a:ext cx="354012" cy="444500"/>
                       </a:xfrm>
                       <a:prstGeom prst="rect">
@@ -5309,8 +4978,8 @@
         </p:nvSpPr>
         <p:spPr>
           <a:xfrm>
-            <a:off x="1288466" y="2888123"/>
-            <a:ext cx="211016" cy="190299"/>
+            <a:off x="1288465" y="2866943"/>
+            <a:ext cx="240505" cy="211479"/>
           </a:xfrm>
           <a:prstGeom prst="rect">
             <a:avLst/>
@@ -5318,7 +4987,7 @@
           <a:noFill/>
           <a:ln>
             <a:solidFill>
-              <a:schemeClr val="accent1"/>
+              <a:srgbClr val="00B050"/>
             </a:solidFill>
           </a:ln>
         </p:spPr>
@@ -5363,7 +5032,7 @@
         </p:nvCxnSpPr>
         <p:spPr>
           <a:xfrm flipV="1">
-            <a:off x="1284394" y="1560095"/>
+            <a:off x="1283881" y="1563258"/>
             <a:ext cx="0" cy="1524000"/>
           </a:xfrm>
           <a:prstGeom prst="straightConnector1">
@@ -5479,12 +5148,266 @@
           </a:fontRef>
         </p:style>
       </p:cxnSp>
+      <p:sp>
+        <p:nvSpPr>
+          <p:cNvPr id="48" name="TextBox 47">
+            <a:extLst>
+              <a:ext uri="{FF2B5EF4-FFF2-40B4-BE49-F238E27FC236}">
+                <a16:creationId xmlns:a16="http://schemas.microsoft.com/office/drawing/2014/main" id="{43F8AADC-77E8-4C2F-0F51-595109A463A1}"/>
+              </a:ext>
+            </a:extLst>
+          </p:cNvPr>
+          <p:cNvSpPr txBox="1"/>
+          <p:nvPr/>
+        </p:nvSpPr>
+        <p:spPr>
+          <a:xfrm>
+            <a:off x="1218774" y="1002779"/>
+            <a:ext cx="4078504" cy="369332"/>
+          </a:xfrm>
+          <a:prstGeom prst="rect">
+            <a:avLst/>
+          </a:prstGeom>
+          <a:noFill/>
+        </p:spPr>
+        <p:txBody>
+          <a:bodyPr wrap="square" rtlCol="0">
+            <a:spAutoFit/>
+          </a:bodyPr>
+          <a:lstStyle/>
+          <a:p>
+            <a:r>
+              <a:rPr lang="en-GB" dirty="0"/>
+              <a:t>Orthogonal lattice</a:t>
+            </a:r>
+          </a:p>
+        </p:txBody>
+      </p:sp>
+      <p:sp>
+        <p:nvSpPr>
+          <p:cNvPr id="49" name="TextBox 48">
+            <a:extLst>
+              <a:ext uri="{FF2B5EF4-FFF2-40B4-BE49-F238E27FC236}">
+                <a16:creationId xmlns:a16="http://schemas.microsoft.com/office/drawing/2014/main" id="{FD500CC8-BE64-8D7B-E3E7-049CC41119ED}"/>
+              </a:ext>
+            </a:extLst>
+          </p:cNvPr>
+          <p:cNvSpPr txBox="1"/>
+          <p:nvPr/>
+        </p:nvSpPr>
+        <p:spPr>
+          <a:xfrm>
+            <a:off x="4772294" y="1009364"/>
+            <a:ext cx="3119023" cy="369332"/>
+          </a:xfrm>
+          <a:prstGeom prst="rect">
+            <a:avLst/>
+          </a:prstGeom>
+          <a:noFill/>
+        </p:spPr>
+        <p:txBody>
+          <a:bodyPr wrap="square" rtlCol="0">
+            <a:spAutoFit/>
+          </a:bodyPr>
+          <a:lstStyle/>
+          <a:p>
+            <a:r>
+              <a:rPr lang="en-GB" dirty="0"/>
+              <a:t>Non-orthogonal lattice</a:t>
+            </a:r>
+          </a:p>
+        </p:txBody>
+      </p:sp>
+      <p:cxnSp>
+        <p:nvCxnSpPr>
+          <p:cNvPr id="52" name="Straight Connector 51">
+            <a:extLst>
+              <a:ext uri="{FF2B5EF4-FFF2-40B4-BE49-F238E27FC236}">
+                <a16:creationId xmlns:a16="http://schemas.microsoft.com/office/drawing/2014/main" id="{AF4522C2-4732-D93C-1E3B-DB3A053C2F8F}"/>
+              </a:ext>
+            </a:extLst>
+          </p:cNvPr>
+          <p:cNvCxnSpPr>
+            <a:cxnSpLocks/>
+          </p:cNvCxnSpPr>
+          <p:nvPr/>
+        </p:nvCxnSpPr>
+        <p:spPr>
+          <a:xfrm flipH="1" flipV="1">
+            <a:off x="4747969" y="2682543"/>
+            <a:ext cx="212945" cy="55916"/>
+          </a:xfrm>
+          <a:prstGeom prst="line">
+            <a:avLst/>
+          </a:prstGeom>
+          <a:ln w="12700">
+            <a:solidFill>
+              <a:srgbClr val="00B050"/>
+            </a:solidFill>
+          </a:ln>
+        </p:spPr>
+        <p:style>
+          <a:lnRef idx="1">
+            <a:schemeClr val="accent1"/>
+          </a:lnRef>
+          <a:fillRef idx="0">
+            <a:schemeClr val="accent1"/>
+          </a:fillRef>
+          <a:effectRef idx="0">
+            <a:schemeClr val="accent1"/>
+          </a:effectRef>
+          <a:fontRef idx="minor">
+            <a:schemeClr val="tx1"/>
+          </a:fontRef>
+        </p:style>
+      </p:cxnSp>
+      <p:cxnSp>
+        <p:nvCxnSpPr>
+          <p:cNvPr id="15" name="Straight Connector 14">
+            <a:extLst>
+              <a:ext uri="{FF2B5EF4-FFF2-40B4-BE49-F238E27FC236}">
+                <a16:creationId xmlns:a16="http://schemas.microsoft.com/office/drawing/2014/main" id="{B75C8C82-C052-4A81-7624-F3A36A89DFF6}"/>
+              </a:ext>
+            </a:extLst>
+          </p:cNvPr>
+          <p:cNvCxnSpPr>
+            <a:cxnSpLocks/>
+          </p:cNvCxnSpPr>
+          <p:nvPr/>
+        </p:nvCxnSpPr>
+        <p:spPr>
+          <a:xfrm>
+            <a:off x="4960914" y="2738459"/>
+            <a:ext cx="2003" cy="204951"/>
+          </a:xfrm>
+          <a:prstGeom prst="line">
+            <a:avLst/>
+          </a:prstGeom>
+          <a:ln w="12700">
+            <a:solidFill>
+              <a:srgbClr val="00B050"/>
+            </a:solidFill>
+          </a:ln>
+        </p:spPr>
+        <p:style>
+          <a:lnRef idx="1">
+            <a:schemeClr val="accent1"/>
+          </a:lnRef>
+          <a:fillRef idx="0">
+            <a:schemeClr val="accent1"/>
+          </a:fillRef>
+          <a:effectRef idx="0">
+            <a:schemeClr val="accent1"/>
+          </a:effectRef>
+          <a:fontRef idx="minor">
+            <a:schemeClr val="tx1"/>
+          </a:fontRef>
+        </p:style>
+      </p:cxnSp>
+      <p:sp>
+        <p:nvSpPr>
+          <p:cNvPr id="12" name="Arc 11">
+            <a:extLst>
+              <a:ext uri="{FF2B5EF4-FFF2-40B4-BE49-F238E27FC236}">
+                <a16:creationId xmlns:a16="http://schemas.microsoft.com/office/drawing/2014/main" id="{0FAF3754-F346-D9DD-B75F-91778A106BC0}"/>
+              </a:ext>
+            </a:extLst>
+          </p:cNvPr>
+          <p:cNvSpPr/>
+          <p:nvPr/>
+        </p:nvSpPr>
+        <p:spPr>
+          <a:xfrm>
+            <a:off x="4412388" y="2614331"/>
+            <a:ext cx="636888" cy="775780"/>
+          </a:xfrm>
+          <a:prstGeom prst="arc">
+            <a:avLst>
+              <a:gd name="adj1" fmla="val 16150493"/>
+              <a:gd name="adj2" fmla="val 401451"/>
+            </a:avLst>
+          </a:prstGeom>
+          <a:ln>
+            <a:solidFill>
+              <a:srgbClr val="00B050"/>
+            </a:solidFill>
+            <a:headEnd type="none"/>
+            <a:tailEnd type="none"/>
+          </a:ln>
+        </p:spPr>
+        <p:style>
+          <a:lnRef idx="1">
+            <a:schemeClr val="accent1"/>
+          </a:lnRef>
+          <a:fillRef idx="0">
+            <a:schemeClr val="accent1"/>
+          </a:fillRef>
+          <a:effectRef idx="0">
+            <a:schemeClr val="accent1"/>
+          </a:effectRef>
+          <a:fontRef idx="minor">
+            <a:schemeClr val="tx1"/>
+          </a:fontRef>
+        </p:style>
+        <p:txBody>
+          <a:bodyPr rtlCol="0" anchor="ctr"/>
+          <a:lstStyle/>
+          <a:p>
+            <a:pPr algn="ctr"/>
+            <a:endParaRPr lang="en-GB" dirty="0"/>
+          </a:p>
+        </p:txBody>
+      </p:sp>
+      <p:cxnSp>
+        <p:nvCxnSpPr>
+          <p:cNvPr id="8" name="Straight Arrow Connector 7">
+            <a:extLst>
+              <a:ext uri="{FF2B5EF4-FFF2-40B4-BE49-F238E27FC236}">
+                <a16:creationId xmlns:a16="http://schemas.microsoft.com/office/drawing/2014/main" id="{B060E5C9-E833-A705-51FD-7117DBFD3F84}"/>
+              </a:ext>
+            </a:extLst>
+          </p:cNvPr>
+          <p:cNvCxnSpPr>
+            <a:cxnSpLocks/>
+          </p:cNvCxnSpPr>
+          <p:nvPr/>
+        </p:nvCxnSpPr>
+        <p:spPr>
+          <a:xfrm>
+            <a:off x="4738202" y="2907705"/>
+            <a:ext cx="1692511" cy="319302"/>
+          </a:xfrm>
+          <a:prstGeom prst="straightConnector1">
+            <a:avLst/>
+          </a:prstGeom>
+          <a:ln w="25400">
+            <a:solidFill>
+              <a:schemeClr val="tx1"/>
+            </a:solidFill>
+            <a:tailEnd type="triangle"/>
+          </a:ln>
+        </p:spPr>
+        <p:style>
+          <a:lnRef idx="1">
+            <a:schemeClr val="accent1"/>
+          </a:lnRef>
+          <a:fillRef idx="0">
+            <a:schemeClr val="accent1"/>
+          </a:fillRef>
+          <a:effectRef idx="0">
+            <a:schemeClr val="accent1"/>
+          </a:effectRef>
+          <a:fontRef idx="minor">
+            <a:schemeClr val="tx1"/>
+          </a:fontRef>
+        </p:style>
+      </p:cxnSp>
       <p:graphicFrame>
         <p:nvGraphicFramePr>
-          <p:cNvPr id="43" name="Object 42">
-            <a:extLst>
-              <a:ext uri="{FF2B5EF4-FFF2-40B4-BE49-F238E27FC236}">
-                <a16:creationId xmlns:a16="http://schemas.microsoft.com/office/drawing/2014/main" id="{78129E1B-24FF-02B0-4FAE-FD994D791D74}"/>
+          <p:cNvPr id="69" name="Object 68">
+            <a:extLst>
+              <a:ext uri="{FF2B5EF4-FFF2-40B4-BE49-F238E27FC236}">
+                <a16:creationId xmlns:a16="http://schemas.microsoft.com/office/drawing/2014/main" id="{ED4C8998-7704-6760-B0E7-603AE8A6FB0A}"/>
               </a:ext>
             </a:extLst>
           </p:cNvPr>
@@ -5494,25 +5417,410 @@
           <p:nvPr>
             <p:extLst>
               <p:ext uri="{D42A27DB-BD31-4B8C-83A1-F6EECF244321}">
-                <p14:modId xmlns:p14="http://schemas.microsoft.com/office/powerpoint/2010/main" val="1874723795"/>
+                <p14:modId xmlns:p14="http://schemas.microsoft.com/office/powerpoint/2010/main" val="3915035592"/>
               </p:ext>
             </p:extLst>
           </p:nvPr>
         </p:nvGraphicFramePr>
         <p:xfrm>
-          <a:off x="1107491" y="2335265"/>
+          <a:off x="4515598" y="3041671"/>
+          <a:ext cx="508000" cy="224341"/>
+        </p:xfrm>
+        <a:graphic>
+          <a:graphicData uri="http://schemas.openxmlformats.org/presentationml/2006/ole">
+            <mc:AlternateContent xmlns:mc="http://schemas.openxmlformats.org/markup-compatibility/2006">
+              <mc:Choice xmlns:v="urn:schemas-microsoft-com:vml" Requires="v">
+                <p:oleObj name="Equation" r:id="rId16" imgW="507960" imgH="203040" progId="Equation.DSMT4">
+                  <p:embed/>
+                </p:oleObj>
+              </mc:Choice>
+              <mc:Fallback>
+                <p:oleObj name="Equation" r:id="rId16" imgW="507960" imgH="203040" progId="Equation.DSMT4">
+                  <p:embed/>
+                  <p:pic>
+                    <p:nvPicPr>
+                      <p:cNvPr id="45" name="Object 44">
+                        <a:extLst>
+                          <a:ext uri="{FF2B5EF4-FFF2-40B4-BE49-F238E27FC236}">
+                            <a16:creationId xmlns:a16="http://schemas.microsoft.com/office/drawing/2014/main" id="{23EC7249-16EB-0251-1C32-AE885078CF08}"/>
+                          </a:ext>
+                        </a:extLst>
+                      </p:cNvPr>
+                      <p:cNvPicPr/>
+                      <p:nvPr/>
+                    </p:nvPicPr>
+                    <p:blipFill>
+                      <a:blip r:embed="rId17"/>
+                      <a:stretch>
+                        <a:fillRect/>
+                      </a:stretch>
+                    </p:blipFill>
+                    <p:spPr>
+                      <a:xfrm>
+                        <a:off x="4515598" y="3041671"/>
+                        <a:ext cx="508000" cy="224341"/>
+                      </a:xfrm>
+                      <a:prstGeom prst="rect">
+                        <a:avLst/>
+                      </a:prstGeom>
+                    </p:spPr>
+                  </p:pic>
+                </p:oleObj>
+              </mc:Fallback>
+            </mc:AlternateContent>
+          </a:graphicData>
+        </a:graphic>
+      </p:graphicFrame>
+      <p:cxnSp>
+        <p:nvCxnSpPr>
+          <p:cNvPr id="77" name="Straight Arrow Connector 76">
+            <a:extLst>
+              <a:ext uri="{FF2B5EF4-FFF2-40B4-BE49-F238E27FC236}">
+                <a16:creationId xmlns:a16="http://schemas.microsoft.com/office/drawing/2014/main" id="{11C9B913-D8FA-7A23-9505-98113B16CAAB}"/>
+              </a:ext>
+            </a:extLst>
+          </p:cNvPr>
+          <p:cNvCxnSpPr>
+            <a:cxnSpLocks/>
+          </p:cNvCxnSpPr>
+          <p:nvPr/>
+        </p:nvCxnSpPr>
+        <p:spPr>
+          <a:xfrm flipH="1">
+            <a:off x="5045088" y="3034270"/>
+            <a:ext cx="5710" cy="190278"/>
+          </a:xfrm>
+          <a:prstGeom prst="straightConnector1">
+            <a:avLst/>
+          </a:prstGeom>
+          <a:ln>
+            <a:solidFill>
+              <a:srgbClr val="00B050"/>
+            </a:solidFill>
+            <a:headEnd type="stealth"/>
+            <a:tailEnd type="none"/>
+          </a:ln>
+        </p:spPr>
+        <p:style>
+          <a:lnRef idx="1">
+            <a:schemeClr val="accent1"/>
+          </a:lnRef>
+          <a:fillRef idx="0">
+            <a:schemeClr val="accent1"/>
+          </a:fillRef>
+          <a:effectRef idx="0">
+            <a:schemeClr val="accent1"/>
+          </a:effectRef>
+          <a:fontRef idx="minor">
+            <a:schemeClr val="tx1"/>
+          </a:fontRef>
+        </p:style>
+      </p:cxnSp>
+      <p:cxnSp>
+        <p:nvCxnSpPr>
+          <p:cNvPr id="83" name="Straight Arrow Connector 82">
+            <a:extLst>
+              <a:ext uri="{FF2B5EF4-FFF2-40B4-BE49-F238E27FC236}">
+                <a16:creationId xmlns:a16="http://schemas.microsoft.com/office/drawing/2014/main" id="{F791C524-AFE6-F52F-50A6-90AFB218FDDC}"/>
+              </a:ext>
+            </a:extLst>
+          </p:cNvPr>
+          <p:cNvCxnSpPr>
+            <a:cxnSpLocks/>
+          </p:cNvCxnSpPr>
+          <p:nvPr/>
+        </p:nvCxnSpPr>
+        <p:spPr>
+          <a:xfrm flipH="1">
+            <a:off x="4589222" y="2614331"/>
+            <a:ext cx="143146" cy="0"/>
+          </a:xfrm>
+          <a:prstGeom prst="straightConnector1">
+            <a:avLst/>
+          </a:prstGeom>
+          <a:ln>
+            <a:solidFill>
+              <a:srgbClr val="00B050"/>
+            </a:solidFill>
+            <a:headEnd type="stealth"/>
+            <a:tailEnd type="none"/>
+          </a:ln>
+        </p:spPr>
+        <p:style>
+          <a:lnRef idx="1">
+            <a:schemeClr val="accent1"/>
+          </a:lnRef>
+          <a:fillRef idx="0">
+            <a:schemeClr val="accent1"/>
+          </a:fillRef>
+          <a:effectRef idx="0">
+            <a:schemeClr val="accent1"/>
+          </a:effectRef>
+          <a:fontRef idx="minor">
+            <a:schemeClr val="tx1"/>
+          </a:fontRef>
+        </p:style>
+      </p:cxnSp>
+      <p:cxnSp>
+        <p:nvCxnSpPr>
+          <p:cNvPr id="5" name="Straight Arrow Connector 4">
+            <a:extLst>
+              <a:ext uri="{FF2B5EF4-FFF2-40B4-BE49-F238E27FC236}">
+                <a16:creationId xmlns:a16="http://schemas.microsoft.com/office/drawing/2014/main" id="{15FF7220-F7F3-2ECA-61DE-85BFED7D5F7A}"/>
+              </a:ext>
+            </a:extLst>
+          </p:cNvPr>
+          <p:cNvCxnSpPr>
+            <a:cxnSpLocks/>
+          </p:cNvCxnSpPr>
+          <p:nvPr/>
+        </p:nvCxnSpPr>
+        <p:spPr>
+          <a:xfrm flipV="1">
+            <a:off x="4741501" y="1396039"/>
+            <a:ext cx="0" cy="1524000"/>
+          </a:xfrm>
+          <a:prstGeom prst="straightConnector1">
+            <a:avLst/>
+          </a:prstGeom>
+          <a:ln w="25400">
+            <a:solidFill>
+              <a:schemeClr val="tx1"/>
+            </a:solidFill>
+            <a:tailEnd type="triangle"/>
+          </a:ln>
+        </p:spPr>
+        <p:style>
+          <a:lnRef idx="1">
+            <a:schemeClr val="accent1"/>
+          </a:lnRef>
+          <a:fillRef idx="0">
+            <a:schemeClr val="accent1"/>
+          </a:fillRef>
+          <a:effectRef idx="0">
+            <a:schemeClr val="accent1"/>
+          </a:effectRef>
+          <a:fontRef idx="minor">
+            <a:schemeClr val="tx1"/>
+          </a:fontRef>
+        </p:style>
+      </p:cxnSp>
+      <p:cxnSp>
+        <p:nvCxnSpPr>
+          <p:cNvPr id="2" name="Straight Arrow Connector 1">
+            <a:extLst>
+              <a:ext uri="{FF2B5EF4-FFF2-40B4-BE49-F238E27FC236}">
+                <a16:creationId xmlns:a16="http://schemas.microsoft.com/office/drawing/2014/main" id="{BB74D303-3253-B62B-9E8B-F20B7B51845B}"/>
+              </a:ext>
+            </a:extLst>
+          </p:cNvPr>
+          <p:cNvCxnSpPr>
+            <a:cxnSpLocks/>
+          </p:cNvCxnSpPr>
+          <p:nvPr/>
+        </p:nvCxnSpPr>
+        <p:spPr>
+          <a:xfrm>
+            <a:off x="4735034" y="2906869"/>
+            <a:ext cx="1842599" cy="768006"/>
+          </a:xfrm>
+          <a:prstGeom prst="straightConnector1">
+            <a:avLst/>
+          </a:prstGeom>
+          <a:ln w="25400">
+            <a:solidFill>
+              <a:schemeClr val="tx1"/>
+            </a:solidFill>
+            <a:tailEnd type="triangle"/>
+          </a:ln>
+        </p:spPr>
+        <p:style>
+          <a:lnRef idx="1">
+            <a:schemeClr val="accent1"/>
+          </a:lnRef>
+          <a:fillRef idx="0">
+            <a:schemeClr val="accent1"/>
+          </a:fillRef>
+          <a:effectRef idx="0">
+            <a:schemeClr val="accent1"/>
+          </a:effectRef>
+          <a:fontRef idx="minor">
+            <a:schemeClr val="tx1"/>
+          </a:fontRef>
+        </p:style>
+      </p:cxnSp>
+      <p:graphicFrame>
+        <p:nvGraphicFramePr>
+          <p:cNvPr id="90" name="Object 89">
+            <a:extLst>
+              <a:ext uri="{FF2B5EF4-FFF2-40B4-BE49-F238E27FC236}">
+                <a16:creationId xmlns:a16="http://schemas.microsoft.com/office/drawing/2014/main" id="{0BB68572-DE89-4A2F-55A6-27FD03CAE9B7}"/>
+              </a:ext>
+            </a:extLst>
+          </p:cNvPr>
+          <p:cNvGraphicFramePr>
+            <a:graphicFrameLocks noChangeAspect="1"/>
+          </p:cNvGraphicFramePr>
+          <p:nvPr>
+            <p:extLst>
+              <p:ext uri="{D42A27DB-BD31-4B8C-83A1-F6EECF244321}">
+                <p14:modId xmlns:p14="http://schemas.microsoft.com/office/powerpoint/2010/main" val="1391971747"/>
+              </p:ext>
+            </p:extLst>
+          </p:nvPr>
+        </p:nvGraphicFramePr>
+        <p:xfrm>
+          <a:off x="1082232" y="3138218"/>
+          <a:ext cx="508000" cy="224341"/>
+        </p:xfrm>
+        <a:graphic>
+          <a:graphicData uri="http://schemas.openxmlformats.org/presentationml/2006/ole">
+            <mc:AlternateContent xmlns:mc="http://schemas.openxmlformats.org/markup-compatibility/2006">
+              <mc:Choice xmlns:v="urn:schemas-microsoft-com:vml" Requires="v">
+                <p:oleObj name="Equation" r:id="rId18" imgW="507960" imgH="203040" progId="Equation.DSMT4">
+                  <p:embed/>
+                </p:oleObj>
+              </mc:Choice>
+              <mc:Fallback>
+                <p:oleObj name="Equation" r:id="rId18" imgW="507960" imgH="203040" progId="Equation.DSMT4">
+                  <p:embed/>
+                  <p:pic>
+                    <p:nvPicPr>
+                      <p:cNvPr id="69" name="Object 68">
+                        <a:extLst>
+                          <a:ext uri="{FF2B5EF4-FFF2-40B4-BE49-F238E27FC236}">
+                            <a16:creationId xmlns:a16="http://schemas.microsoft.com/office/drawing/2014/main" id="{ED4C8998-7704-6760-B0E7-603AE8A6FB0A}"/>
+                          </a:ext>
+                        </a:extLst>
+                      </p:cNvPr>
+                      <p:cNvPicPr/>
+                      <p:nvPr/>
+                    </p:nvPicPr>
+                    <p:blipFill>
+                      <a:blip r:embed="rId19"/>
+                      <a:stretch>
+                        <a:fillRect/>
+                      </a:stretch>
+                    </p:blipFill>
+                    <p:spPr>
+                      <a:xfrm>
+                        <a:off x="1082232" y="3138218"/>
+                        <a:ext cx="508000" cy="224341"/>
+                      </a:xfrm>
+                      <a:prstGeom prst="rect">
+                        <a:avLst/>
+                      </a:prstGeom>
+                    </p:spPr>
+                  </p:pic>
+                </p:oleObj>
+              </mc:Fallback>
+            </mc:AlternateContent>
+          </a:graphicData>
+        </a:graphic>
+      </p:graphicFrame>
+      <p:graphicFrame>
+        <p:nvGraphicFramePr>
+          <p:cNvPr id="91" name="Object 90">
+            <a:extLst>
+              <a:ext uri="{FF2B5EF4-FFF2-40B4-BE49-F238E27FC236}">
+                <a16:creationId xmlns:a16="http://schemas.microsoft.com/office/drawing/2014/main" id="{FFC8ED7B-230D-43F2-C00C-4638B653ACFF}"/>
+              </a:ext>
+            </a:extLst>
+          </p:cNvPr>
+          <p:cNvGraphicFramePr>
+            <a:graphicFrameLocks noChangeAspect="1"/>
+          </p:cNvGraphicFramePr>
+          <p:nvPr>
+            <p:extLst>
+              <p:ext uri="{D42A27DB-BD31-4B8C-83A1-F6EECF244321}">
+                <p14:modId xmlns:p14="http://schemas.microsoft.com/office/powerpoint/2010/main" val="801568519"/>
+              </p:ext>
+            </p:extLst>
+          </p:nvPr>
+        </p:nvGraphicFramePr>
+        <p:xfrm>
+          <a:off x="1920172" y="3081061"/>
+          <a:ext cx="165100" cy="203200"/>
+        </p:xfrm>
+        <a:graphic>
+          <a:graphicData uri="http://schemas.openxmlformats.org/presentationml/2006/ole">
+            <mc:AlternateContent xmlns:mc="http://schemas.openxmlformats.org/markup-compatibility/2006">
+              <mc:Choice xmlns:v="urn:schemas-microsoft-com:vml" Requires="v">
+                <p:oleObj name="Equation" r:id="rId20" imgW="164880" imgH="203040" progId="Equation.DSMT4">
+                  <p:embed/>
+                </p:oleObj>
+              </mc:Choice>
+              <mc:Fallback>
+                <p:oleObj name="Equation" r:id="rId20" imgW="164880" imgH="203040" progId="Equation.DSMT4">
+                  <p:embed/>
+                  <p:pic>
+                    <p:nvPicPr>
+                      <p:cNvPr id="20" name="Object 19">
+                        <a:extLst>
+                          <a:ext uri="{FF2B5EF4-FFF2-40B4-BE49-F238E27FC236}">
+                            <a16:creationId xmlns:a16="http://schemas.microsoft.com/office/drawing/2014/main" id="{5943B85C-EE42-6EB5-07BF-2E668310DBEF}"/>
+                          </a:ext>
+                        </a:extLst>
+                      </p:cNvPr>
+                      <p:cNvPicPr/>
+                      <p:nvPr/>
+                    </p:nvPicPr>
+                    <p:blipFill>
+                      <a:blip r:embed="rId15"/>
+                      <a:stretch>
+                        <a:fillRect/>
+                      </a:stretch>
+                    </p:blipFill>
+                    <p:spPr>
+                      <a:xfrm>
+                        <a:off x="1920172" y="3081061"/>
+                        <a:ext cx="165100" cy="203200"/>
+                      </a:xfrm>
+                      <a:prstGeom prst="rect">
+                        <a:avLst/>
+                      </a:prstGeom>
+                    </p:spPr>
+                  </p:pic>
+                </p:oleObj>
+              </mc:Fallback>
+            </mc:AlternateContent>
+          </a:graphicData>
+        </a:graphic>
+      </p:graphicFrame>
+      <p:graphicFrame>
+        <p:nvGraphicFramePr>
+          <p:cNvPr id="92" name="Object 91">
+            <a:extLst>
+              <a:ext uri="{FF2B5EF4-FFF2-40B4-BE49-F238E27FC236}">
+                <a16:creationId xmlns:a16="http://schemas.microsoft.com/office/drawing/2014/main" id="{34963AC5-4695-8383-8572-31D8ED739E0C}"/>
+              </a:ext>
+            </a:extLst>
+          </p:cNvPr>
+          <p:cNvGraphicFramePr>
+            <a:graphicFrameLocks noChangeAspect="1"/>
+          </p:cNvGraphicFramePr>
+          <p:nvPr>
+            <p:extLst>
+              <p:ext uri="{D42A27DB-BD31-4B8C-83A1-F6EECF244321}">
+                <p14:modId xmlns:p14="http://schemas.microsoft.com/office/powerpoint/2010/main" val="3783056684"/>
+              </p:ext>
+            </p:extLst>
+          </p:nvPr>
+        </p:nvGraphicFramePr>
+        <p:xfrm>
+          <a:off x="1099993" y="2190175"/>
           <a:ext cx="152400" cy="203200"/>
         </p:xfrm>
         <a:graphic>
           <a:graphicData uri="http://schemas.openxmlformats.org/presentationml/2006/ole">
             <mc:AlternateContent xmlns:mc="http://schemas.openxmlformats.org/markup-compatibility/2006">
               <mc:Choice xmlns:v="urn:schemas-microsoft-com:vml" Requires="v">
-                <p:oleObj name="Equation" r:id="rId12" imgW="152280" imgH="203040" progId="Equation.DSMT4">
+                <p:oleObj name="Equation" r:id="rId21" imgW="152280" imgH="203040" progId="Equation.DSMT4">
                   <p:embed/>
                 </p:oleObj>
               </mc:Choice>
               <mc:Fallback>
-                <p:oleObj name="Equation" r:id="rId12" imgW="152280" imgH="203040" progId="Equation.DSMT4">
+                <p:oleObj name="Equation" r:id="rId21" imgW="152280" imgH="203040" progId="Equation.DSMT4">
                   <p:embed/>
                   <p:pic>
                     <p:nvPicPr>
@@ -5534,7 +5842,7 @@
                     </p:blipFill>
                     <p:spPr>
                       <a:xfrm>
-                        <a:off x="1107491" y="2335265"/>
+                        <a:off x="1099993" y="2190175"/>
                         <a:ext cx="152400" cy="203200"/>
                       </a:xfrm>
                       <a:prstGeom prst="rect">
@@ -5548,12 +5856,274 @@
           </a:graphicData>
         </a:graphic>
       </p:graphicFrame>
+      <p:cxnSp>
+        <p:nvCxnSpPr>
+          <p:cNvPr id="93" name="Straight Arrow Connector 92">
+            <a:extLst>
+              <a:ext uri="{FF2B5EF4-FFF2-40B4-BE49-F238E27FC236}">
+                <a16:creationId xmlns:a16="http://schemas.microsoft.com/office/drawing/2014/main" id="{DACC495C-F27A-1C68-8C19-6F1F0F996521}"/>
+              </a:ext>
+            </a:extLst>
+          </p:cNvPr>
+          <p:cNvCxnSpPr>
+            <a:cxnSpLocks/>
+          </p:cNvCxnSpPr>
+          <p:nvPr/>
+        </p:nvCxnSpPr>
+        <p:spPr>
+          <a:xfrm flipH="1">
+            <a:off x="1132199" y="2772547"/>
+            <a:ext cx="143146" cy="0"/>
+          </a:xfrm>
+          <a:prstGeom prst="straightConnector1">
+            <a:avLst/>
+          </a:prstGeom>
+          <a:ln>
+            <a:solidFill>
+              <a:srgbClr val="00B050"/>
+            </a:solidFill>
+            <a:headEnd type="stealth"/>
+            <a:tailEnd type="none"/>
+          </a:ln>
+        </p:spPr>
+        <p:style>
+          <a:lnRef idx="1">
+            <a:schemeClr val="accent1"/>
+          </a:lnRef>
+          <a:fillRef idx="0">
+            <a:schemeClr val="accent1"/>
+          </a:fillRef>
+          <a:effectRef idx="0">
+            <a:schemeClr val="accent1"/>
+          </a:effectRef>
+          <a:fontRef idx="minor">
+            <a:schemeClr val="tx1"/>
+          </a:fontRef>
+        </p:style>
+      </p:cxnSp>
+      <p:cxnSp>
+        <p:nvCxnSpPr>
+          <p:cNvPr id="94" name="Straight Arrow Connector 93">
+            <a:extLst>
+              <a:ext uri="{FF2B5EF4-FFF2-40B4-BE49-F238E27FC236}">
+                <a16:creationId xmlns:a16="http://schemas.microsoft.com/office/drawing/2014/main" id="{9AE0F7B0-25AE-24FB-9CD7-E35AC2FCC01E}"/>
+              </a:ext>
+            </a:extLst>
+          </p:cNvPr>
+          <p:cNvCxnSpPr>
+            <a:cxnSpLocks/>
+          </p:cNvCxnSpPr>
+          <p:nvPr/>
+        </p:nvCxnSpPr>
+        <p:spPr>
+          <a:xfrm>
+            <a:off x="1618314" y="3092414"/>
+            <a:ext cx="1082" cy="267816"/>
+          </a:xfrm>
+          <a:prstGeom prst="straightConnector1">
+            <a:avLst/>
+          </a:prstGeom>
+          <a:ln>
+            <a:solidFill>
+              <a:srgbClr val="00B050"/>
+            </a:solidFill>
+            <a:headEnd type="stealth"/>
+            <a:tailEnd type="none"/>
+          </a:ln>
+        </p:spPr>
+        <p:style>
+          <a:lnRef idx="1">
+            <a:schemeClr val="accent1"/>
+          </a:lnRef>
+          <a:fillRef idx="0">
+            <a:schemeClr val="accent1"/>
+          </a:fillRef>
+          <a:effectRef idx="0">
+            <a:schemeClr val="accent1"/>
+          </a:effectRef>
+          <a:fontRef idx="minor">
+            <a:schemeClr val="tx1"/>
+          </a:fontRef>
+        </p:style>
+      </p:cxnSp>
+      <p:cxnSp>
+        <p:nvCxnSpPr>
+          <p:cNvPr id="99" name="Straight Connector 98">
+            <a:extLst>
+              <a:ext uri="{FF2B5EF4-FFF2-40B4-BE49-F238E27FC236}">
+                <a16:creationId xmlns:a16="http://schemas.microsoft.com/office/drawing/2014/main" id="{0651E46F-AF43-7AA8-3E5A-13F4C7297392}"/>
+              </a:ext>
+            </a:extLst>
+          </p:cNvPr>
+          <p:cNvCxnSpPr>
+            <a:cxnSpLocks/>
+          </p:cNvCxnSpPr>
+          <p:nvPr/>
+        </p:nvCxnSpPr>
+        <p:spPr>
+          <a:xfrm flipH="1">
+            <a:off x="4615933" y="1877712"/>
+            <a:ext cx="223268" cy="102956"/>
+          </a:xfrm>
+          <a:prstGeom prst="line">
+            <a:avLst/>
+          </a:prstGeom>
+          <a:ln w="25400">
+            <a:solidFill>
+              <a:srgbClr val="00B050"/>
+            </a:solidFill>
+          </a:ln>
+        </p:spPr>
+        <p:style>
+          <a:lnRef idx="1">
+            <a:schemeClr val="accent1"/>
+          </a:lnRef>
+          <a:fillRef idx="0">
+            <a:schemeClr val="accent1"/>
+          </a:fillRef>
+          <a:effectRef idx="0">
+            <a:schemeClr val="accent1"/>
+          </a:effectRef>
+          <a:fontRef idx="minor">
+            <a:schemeClr val="tx1"/>
+          </a:fontRef>
+        </p:style>
+      </p:cxnSp>
+      <p:cxnSp>
+        <p:nvCxnSpPr>
+          <p:cNvPr id="100" name="Straight Connector 99">
+            <a:extLst>
+              <a:ext uri="{FF2B5EF4-FFF2-40B4-BE49-F238E27FC236}">
+                <a16:creationId xmlns:a16="http://schemas.microsoft.com/office/drawing/2014/main" id="{E2F63276-670A-F8BF-3A54-20ECFCF1DA1E}"/>
+              </a:ext>
+            </a:extLst>
+          </p:cNvPr>
+          <p:cNvCxnSpPr>
+            <a:cxnSpLocks/>
+          </p:cNvCxnSpPr>
+          <p:nvPr/>
+        </p:nvCxnSpPr>
+        <p:spPr>
+          <a:xfrm flipV="1">
+            <a:off x="5640007" y="3277090"/>
+            <a:ext cx="233436" cy="109051"/>
+          </a:xfrm>
+          <a:prstGeom prst="line">
+            <a:avLst/>
+          </a:prstGeom>
+          <a:ln w="25400">
+            <a:solidFill>
+              <a:srgbClr val="00B050"/>
+            </a:solidFill>
+          </a:ln>
+        </p:spPr>
+        <p:style>
+          <a:lnRef idx="1">
+            <a:schemeClr val="accent1"/>
+          </a:lnRef>
+          <a:fillRef idx="0">
+            <a:schemeClr val="accent1"/>
+          </a:fillRef>
+          <a:effectRef idx="0">
+            <a:schemeClr val="accent1"/>
+          </a:effectRef>
+          <a:fontRef idx="minor">
+            <a:schemeClr val="tx1"/>
+          </a:fontRef>
+        </p:style>
+      </p:cxnSp>
+      <p:cxnSp>
+        <p:nvCxnSpPr>
+          <p:cNvPr id="108" name="Straight Connector 107">
+            <a:extLst>
+              <a:ext uri="{FF2B5EF4-FFF2-40B4-BE49-F238E27FC236}">
+                <a16:creationId xmlns:a16="http://schemas.microsoft.com/office/drawing/2014/main" id="{60E51796-5C78-BAEE-F585-0EA3FC515CE9}"/>
+              </a:ext>
+            </a:extLst>
+          </p:cNvPr>
+          <p:cNvCxnSpPr>
+            <a:cxnSpLocks/>
+          </p:cNvCxnSpPr>
+          <p:nvPr/>
+        </p:nvCxnSpPr>
+        <p:spPr>
+          <a:xfrm flipV="1">
+            <a:off x="2089531" y="3034270"/>
+            <a:ext cx="179261" cy="98982"/>
+          </a:xfrm>
+          <a:prstGeom prst="line">
+            <a:avLst/>
+          </a:prstGeom>
+          <a:ln w="25400">
+            <a:solidFill>
+              <a:srgbClr val="00B050"/>
+            </a:solidFill>
+          </a:ln>
+        </p:spPr>
+        <p:style>
+          <a:lnRef idx="1">
+            <a:schemeClr val="accent1"/>
+          </a:lnRef>
+          <a:fillRef idx="0">
+            <a:schemeClr val="accent1"/>
+          </a:fillRef>
+          <a:effectRef idx="0">
+            <a:schemeClr val="accent1"/>
+          </a:effectRef>
+          <a:fontRef idx="minor">
+            <a:schemeClr val="tx1"/>
+          </a:fontRef>
+        </p:style>
+      </p:cxnSp>
+      <p:cxnSp>
+        <p:nvCxnSpPr>
+          <p:cNvPr id="110" name="Straight Connector 109">
+            <a:extLst>
+              <a:ext uri="{FF2B5EF4-FFF2-40B4-BE49-F238E27FC236}">
+                <a16:creationId xmlns:a16="http://schemas.microsoft.com/office/drawing/2014/main" id="{A7C15EC6-3A16-5BFA-26F6-77BBDC79B852}"/>
+              </a:ext>
+            </a:extLst>
+          </p:cNvPr>
+          <p:cNvCxnSpPr>
+            <a:cxnSpLocks/>
+          </p:cNvCxnSpPr>
+          <p:nvPr/>
+        </p:nvCxnSpPr>
+        <p:spPr>
+          <a:xfrm flipV="1">
+            <a:off x="1994579" y="2672519"/>
+            <a:ext cx="293489" cy="8723"/>
+          </a:xfrm>
+          <a:prstGeom prst="line">
+            <a:avLst/>
+          </a:prstGeom>
+          <a:ln w="25400">
+            <a:solidFill>
+              <a:srgbClr val="00B050"/>
+            </a:solidFill>
+          </a:ln>
+        </p:spPr>
+        <p:style>
+          <a:lnRef idx="1">
+            <a:schemeClr val="accent1"/>
+          </a:lnRef>
+          <a:fillRef idx="0">
+            <a:schemeClr val="accent1"/>
+          </a:fillRef>
+          <a:effectRef idx="0">
+            <a:schemeClr val="accent1"/>
+          </a:effectRef>
+          <a:fontRef idx="minor">
+            <a:schemeClr val="tx1"/>
+          </a:fontRef>
+        </p:style>
+      </p:cxnSp>
       <p:graphicFrame>
         <p:nvGraphicFramePr>
-          <p:cNvPr id="44" name="Object 43">
-            <a:extLst>
-              <a:ext uri="{FF2B5EF4-FFF2-40B4-BE49-F238E27FC236}">
-                <a16:creationId xmlns:a16="http://schemas.microsoft.com/office/drawing/2014/main" id="{FDF2F1CC-1033-776C-10E6-96D2FF1D38CD}"/>
+          <p:cNvPr id="113" name="Object 112">
+            <a:extLst>
+              <a:ext uri="{FF2B5EF4-FFF2-40B4-BE49-F238E27FC236}">
+                <a16:creationId xmlns:a16="http://schemas.microsoft.com/office/drawing/2014/main" id="{FCB23EBE-76A1-1BB1-A87D-474A9374F9A6}"/>
               </a:ext>
             </a:extLst>
           </p:cNvPr>
@@ -5563,32 +6133,32 @@
           <p:nvPr>
             <p:extLst>
               <p:ext uri="{D42A27DB-BD31-4B8C-83A1-F6EECF244321}">
-                <p14:modId xmlns:p14="http://schemas.microsoft.com/office/powerpoint/2010/main" val="79647267"/>
+                <p14:modId xmlns:p14="http://schemas.microsoft.com/office/powerpoint/2010/main" val="323075389"/>
               </p:ext>
             </p:extLst>
           </p:nvPr>
         </p:nvGraphicFramePr>
         <p:xfrm>
-          <a:off x="1739226" y="3175689"/>
+          <a:off x="1834786" y="2544702"/>
           <a:ext cx="165100" cy="203200"/>
         </p:xfrm>
         <a:graphic>
           <a:graphicData uri="http://schemas.openxmlformats.org/presentationml/2006/ole">
             <mc:AlternateContent xmlns:mc="http://schemas.openxmlformats.org/markup-compatibility/2006">
               <mc:Choice xmlns:v="urn:schemas-microsoft-com:vml" Requires="v">
-                <p:oleObj name="Equation" r:id="rId14" imgW="164880" imgH="203040" progId="Equation.DSMT4">
+                <p:oleObj name="Equation" r:id="rId22" imgW="164880" imgH="203040" progId="Equation.DSMT4">
                   <p:embed/>
                 </p:oleObj>
               </mc:Choice>
               <mc:Fallback>
-                <p:oleObj name="Equation" r:id="rId14" imgW="164880" imgH="203040" progId="Equation.DSMT4">
+                <p:oleObj name="Equation" r:id="rId22" imgW="164880" imgH="203040" progId="Equation.DSMT4">
                   <p:embed/>
                   <p:pic>
                     <p:nvPicPr>
-                      <p:cNvPr id="20" name="Object 19">
+                      <p:cNvPr id="91" name="Object 90">
                         <a:extLst>
                           <a:ext uri="{FF2B5EF4-FFF2-40B4-BE49-F238E27FC236}">
-                            <a16:creationId xmlns:a16="http://schemas.microsoft.com/office/drawing/2014/main" id="{5943B85C-EE42-6EB5-07BF-2E668310DBEF}"/>
+                            <a16:creationId xmlns:a16="http://schemas.microsoft.com/office/drawing/2014/main" id="{FFC8ED7B-230D-43F2-C00C-4638B653ACFF}"/>
                           </a:ext>
                         </a:extLst>
                       </p:cNvPr>
@@ -5596,14 +6166,14 @@
                       <p:nvPr/>
                     </p:nvPicPr>
                     <p:blipFill>
-                      <a:blip r:embed="rId15"/>
+                      <a:blip r:embed="rId23"/>
                       <a:stretch>
                         <a:fillRect/>
                       </a:stretch>
                     </p:blipFill>
                     <p:spPr>
                       <a:xfrm>
-                        <a:off x="1739226" y="3175689"/>
+                        <a:off x="1834786" y="2544702"/>
                         <a:ext cx="165100" cy="203200"/>
                       </a:xfrm>
                       <a:prstGeom prst="rect">
@@ -5619,10 +6189,10 @@
       </p:graphicFrame>
       <p:graphicFrame>
         <p:nvGraphicFramePr>
-          <p:cNvPr id="45" name="Object 44">
-            <a:extLst>
-              <a:ext uri="{FF2B5EF4-FFF2-40B4-BE49-F238E27FC236}">
-                <a16:creationId xmlns:a16="http://schemas.microsoft.com/office/drawing/2014/main" id="{23EC7249-16EB-0251-1C32-AE885078CF08}"/>
+          <p:cNvPr id="114" name="Object 113">
+            <a:extLst>
+              <a:ext uri="{FF2B5EF4-FFF2-40B4-BE49-F238E27FC236}">
+                <a16:creationId xmlns:a16="http://schemas.microsoft.com/office/drawing/2014/main" id="{6390390E-8AE6-B98E-4D96-7152F9CE9FFB}"/>
               </a:ext>
             </a:extLst>
           </p:cNvPr>
@@ -5632,32 +6202,32 @@
           <p:nvPr>
             <p:extLst>
               <p:ext uri="{D42A27DB-BD31-4B8C-83A1-F6EECF244321}">
-                <p14:modId xmlns:p14="http://schemas.microsoft.com/office/powerpoint/2010/main" val="43192710"/>
+                <p14:modId xmlns:p14="http://schemas.microsoft.com/office/powerpoint/2010/main" val="1292954746"/>
               </p:ext>
             </p:extLst>
           </p:nvPr>
         </p:nvGraphicFramePr>
         <p:xfrm>
-          <a:off x="1399891" y="2623719"/>
-          <a:ext cx="508000" cy="204299"/>
+          <a:off x="5294712" y="2382315"/>
+          <a:ext cx="165100" cy="203200"/>
         </p:xfrm>
         <a:graphic>
           <a:graphicData uri="http://schemas.openxmlformats.org/presentationml/2006/ole">
             <mc:AlternateContent xmlns:mc="http://schemas.openxmlformats.org/markup-compatibility/2006">
               <mc:Choice xmlns:v="urn:schemas-microsoft-com:vml" Requires="v">
-                <p:oleObj name="Equation" r:id="rId18" imgW="507960" imgH="203040" progId="Equation.DSMT4">
+                <p:oleObj name="Equation" r:id="rId24" imgW="164880" imgH="203040" progId="Equation.DSMT4">
                   <p:embed/>
                 </p:oleObj>
               </mc:Choice>
               <mc:Fallback>
-                <p:oleObj name="Equation" r:id="rId18" imgW="507960" imgH="203040" progId="Equation.DSMT4">
+                <p:oleObj name="Equation" r:id="rId24" imgW="164880" imgH="203040" progId="Equation.DSMT4">
                   <p:embed/>
                   <p:pic>
                     <p:nvPicPr>
-                      <p:cNvPr id="21" name="Object 20">
+                      <p:cNvPr id="113" name="Object 112">
                         <a:extLst>
                           <a:ext uri="{FF2B5EF4-FFF2-40B4-BE49-F238E27FC236}">
-                            <a16:creationId xmlns:a16="http://schemas.microsoft.com/office/drawing/2014/main" id="{AADBE3B0-0071-78D7-21C8-2C98711DB58F}"/>
+                            <a16:creationId xmlns:a16="http://schemas.microsoft.com/office/drawing/2014/main" id="{FCB23EBE-76A1-1BB1-A87D-474A9374F9A6}"/>
                           </a:ext>
                         </a:extLst>
                       </p:cNvPr>
@@ -5665,15 +6235,15 @@
                       <p:nvPr/>
                     </p:nvPicPr>
                     <p:blipFill>
-                      <a:blip r:embed="rId19"/>
+                      <a:blip r:embed="rId23"/>
                       <a:stretch>
                         <a:fillRect/>
                       </a:stretch>
                     </p:blipFill>
                     <p:spPr>
                       <a:xfrm>
-                        <a:off x="1399891" y="2623719"/>
-                        <a:ext cx="508000" cy="204299"/>
+                        <a:off x="5294712" y="2382315"/>
+                        <a:ext cx="165100" cy="203200"/>
                       </a:xfrm>
                       <a:prstGeom prst="rect">
                         <a:avLst/>
@@ -5686,76 +6256,92 @@
           </a:graphicData>
         </a:graphic>
       </p:graphicFrame>
-      <p:sp>
-        <p:nvSpPr>
-          <p:cNvPr id="48" name="TextBox 47">
-            <a:extLst>
-              <a:ext uri="{FF2B5EF4-FFF2-40B4-BE49-F238E27FC236}">
-                <a16:creationId xmlns:a16="http://schemas.microsoft.com/office/drawing/2014/main" id="{43F8AADC-77E8-4C2F-0F51-595109A463A1}"/>
-              </a:ext>
-            </a:extLst>
-          </p:cNvPr>
-          <p:cNvSpPr txBox="1"/>
+      <p:cxnSp>
+        <p:nvCxnSpPr>
+          <p:cNvPr id="115" name="Straight Connector 114">
+            <a:extLst>
+              <a:ext uri="{FF2B5EF4-FFF2-40B4-BE49-F238E27FC236}">
+                <a16:creationId xmlns:a16="http://schemas.microsoft.com/office/drawing/2014/main" id="{2D2311C9-639B-1C6D-9B99-BFB362D372A0}"/>
+              </a:ext>
+            </a:extLst>
+          </p:cNvPr>
+          <p:cNvCxnSpPr>
+            <a:cxnSpLocks/>
+          </p:cNvCxnSpPr>
           <p:nvPr/>
-        </p:nvSpPr>
+        </p:nvCxnSpPr>
         <p:spPr>
           <a:xfrm>
-            <a:off x="1218774" y="1002779"/>
-            <a:ext cx="4078504" cy="369332"/>
+            <a:off x="5466246" y="2455873"/>
+            <a:ext cx="242148" cy="98135"/>
           </a:xfrm>
-          <a:prstGeom prst="rect">
+          <a:prstGeom prst="line">
             <a:avLst/>
           </a:prstGeom>
-          <a:noFill/>
+          <a:ln w="25400">
+            <a:solidFill>
+              <a:srgbClr val="00B050"/>
+            </a:solidFill>
+          </a:ln>
         </p:spPr>
-        <p:txBody>
-          <a:bodyPr wrap="square" rtlCol="0">
-            <a:spAutoFit/>
-          </a:bodyPr>
-          <a:lstStyle/>
-          <a:p>
-            <a:r>
-              <a:rPr lang="en-GB" dirty="0"/>
-              <a:t>Orthogonal lattice</a:t>
-            </a:r>
-          </a:p>
-        </p:txBody>
-      </p:sp>
-      <p:sp>
-        <p:nvSpPr>
-          <p:cNvPr id="49" name="TextBox 48">
-            <a:extLst>
-              <a:ext uri="{FF2B5EF4-FFF2-40B4-BE49-F238E27FC236}">
-                <a16:creationId xmlns:a16="http://schemas.microsoft.com/office/drawing/2014/main" id="{FD500CC8-BE64-8D7B-E3E7-049CC41119ED}"/>
-              </a:ext>
-            </a:extLst>
-          </p:cNvPr>
-          <p:cNvSpPr txBox="1"/>
+        <p:style>
+          <a:lnRef idx="1">
+            <a:schemeClr val="accent1"/>
+          </a:lnRef>
+          <a:fillRef idx="0">
+            <a:schemeClr val="accent1"/>
+          </a:fillRef>
+          <a:effectRef idx="0">
+            <a:schemeClr val="accent1"/>
+          </a:effectRef>
+          <a:fontRef idx="minor">
+            <a:schemeClr val="tx1"/>
+          </a:fontRef>
+        </p:style>
+      </p:cxnSp>
+      <p:cxnSp>
+        <p:nvCxnSpPr>
+          <p:cNvPr id="132" name="Straight Connector 131">
+            <a:extLst>
+              <a:ext uri="{FF2B5EF4-FFF2-40B4-BE49-F238E27FC236}">
+                <a16:creationId xmlns:a16="http://schemas.microsoft.com/office/drawing/2014/main" id="{E677D9EC-9D52-90C5-30FA-A16184857CC3}"/>
+              </a:ext>
+            </a:extLst>
+          </p:cNvPr>
+          <p:cNvCxnSpPr>
+            <a:cxnSpLocks/>
+          </p:cNvCxnSpPr>
           <p:nvPr/>
-        </p:nvSpPr>
+        </p:nvCxnSpPr>
         <p:spPr>
-          <a:xfrm>
-            <a:off x="4764000" y="1002779"/>
-            <a:ext cx="3119023" cy="369332"/>
+          <a:xfrm flipH="1">
+            <a:off x="1166613" y="2070752"/>
+            <a:ext cx="223268" cy="102956"/>
           </a:xfrm>
-          <a:prstGeom prst="rect">
+          <a:prstGeom prst="line">
             <a:avLst/>
           </a:prstGeom>
-          <a:noFill/>
+          <a:ln w="25400">
+            <a:solidFill>
+              <a:srgbClr val="00B050"/>
+            </a:solidFill>
+          </a:ln>
         </p:spPr>
-        <p:txBody>
-          <a:bodyPr wrap="square" rtlCol="0">
-            <a:spAutoFit/>
-          </a:bodyPr>
-          <a:lstStyle/>
-          <a:p>
-            <a:r>
-              <a:rPr lang="en-GB" dirty="0"/>
-              <a:t>Non-orthogonal lattice</a:t>
-            </a:r>
-          </a:p>
-        </p:txBody>
-      </p:sp>
+        <p:style>
+          <a:lnRef idx="1">
+            <a:schemeClr val="accent1"/>
+          </a:lnRef>
+          <a:fillRef idx="0">
+            <a:schemeClr val="accent1"/>
+          </a:fillRef>
+          <a:effectRef idx="0">
+            <a:schemeClr val="accent1"/>
+          </a:effectRef>
+          <a:fontRef idx="minor">
+            <a:schemeClr val="tx1"/>
+          </a:fontRef>
+        </p:style>
+      </p:cxnSp>
     </p:spTree>
     <p:extLst>
       <p:ext uri="{BB962C8B-B14F-4D97-AF65-F5344CB8AC3E}">

</xml_diff>

<commit_message>
Re #1549 source of the latest picture
</commit_message>
<xml_diff>
--- a/documentation/user_docs/docs/images/Spherical_Coordinates_fig_source.pptx
+++ b/documentation/user_docs/docs/images/Spherical_Coordinates_fig_source.pptx
@@ -3874,8 +3874,8 @@
         </p:nvCxnSpPr>
         <p:spPr>
           <a:xfrm flipV="1">
-            <a:off x="5531525" y="2648420"/>
-            <a:ext cx="821945" cy="387640"/>
+            <a:off x="5523028" y="2648420"/>
+            <a:ext cx="830442" cy="400930"/>
           </a:xfrm>
           <a:prstGeom prst="straightConnector1">
             <a:avLst/>
@@ -3919,8 +3919,8 @@
         </p:nvCxnSpPr>
         <p:spPr>
           <a:xfrm>
-            <a:off x="5312113" y="2639784"/>
-            <a:ext cx="1029607" cy="6518"/>
+            <a:off x="5098704" y="2642626"/>
+            <a:ext cx="1243016" cy="3676"/>
           </a:xfrm>
           <a:prstGeom prst="straightConnector1">
             <a:avLst/>
@@ -3974,6 +3974,7 @@
             <a:solidFill>
               <a:schemeClr val="tx1"/>
             </a:solidFill>
+            <a:prstDash val="dash"/>
             <a:tailEnd type="triangle"/>
           </a:ln>
         </p:spPr>
@@ -4877,6 +4878,7 @@
             <a:solidFill>
               <a:schemeClr val="tx1"/>
             </a:solidFill>
+            <a:prstDash val="dash"/>
             <a:tailEnd type="triangle"/>
           </a:ln>
         </p:spPr>
@@ -5374,8 +5376,8 @@
         </p:nvCxnSpPr>
         <p:spPr>
           <a:xfrm>
-            <a:off x="4738202" y="2907705"/>
-            <a:ext cx="1692511" cy="319302"/>
+            <a:off x="4755491" y="2896989"/>
+            <a:ext cx="1556798" cy="345736"/>
           </a:xfrm>
           <a:prstGeom prst="straightConnector1">
             <a:avLst/>
@@ -6325,6 +6327,52 @@
             <a:solidFill>
               <a:srgbClr val="00B050"/>
             </a:solidFill>
+          </a:ln>
+        </p:spPr>
+        <p:style>
+          <a:lnRef idx="1">
+            <a:schemeClr val="accent1"/>
+          </a:lnRef>
+          <a:fillRef idx="0">
+            <a:schemeClr val="accent1"/>
+          </a:fillRef>
+          <a:effectRef idx="0">
+            <a:schemeClr val="accent1"/>
+          </a:effectRef>
+          <a:fontRef idx="minor">
+            <a:schemeClr val="tx1"/>
+          </a:fontRef>
+        </p:style>
+      </p:cxnSp>
+      <p:cxnSp>
+        <p:nvCxnSpPr>
+          <p:cNvPr id="11" name="Straight Arrow Connector 10">
+            <a:extLst>
+              <a:ext uri="{FF2B5EF4-FFF2-40B4-BE49-F238E27FC236}">
+                <a16:creationId xmlns:a16="http://schemas.microsoft.com/office/drawing/2014/main" id="{19D3B20C-22B6-99AA-805A-D816A243BC08}"/>
+              </a:ext>
+            </a:extLst>
+          </p:cNvPr>
+          <p:cNvCxnSpPr>
+            <a:cxnSpLocks/>
+            <a:endCxn id="114" idx="0"/>
+          </p:cNvCxnSpPr>
+          <p:nvPr/>
+        </p:nvCxnSpPr>
+        <p:spPr>
+          <a:xfrm flipV="1">
+            <a:off x="4749386" y="2382315"/>
+            <a:ext cx="627876" cy="519253"/>
+          </a:xfrm>
+          <a:prstGeom prst="straightConnector1">
+            <a:avLst/>
+          </a:prstGeom>
+          <a:ln w="25400">
+            <a:solidFill>
+              <a:schemeClr val="tx1"/>
+            </a:solidFill>
+            <a:prstDash val="dash"/>
+            <a:tailEnd type="triangle"/>
           </a:ln>
         </p:spPr>
         <p:style>

</xml_diff>